<commit_message>
added slides for unittesting
</commit_message>
<xml_diff>
--- a/PPT/09- Angular Unittesting.pptx
+++ b/PPT/09- Angular Unittesting.pptx
@@ -5,18 +5,30 @@
     <p:sldMasterId id="2147483648" r:id="rId1"/>
   </p:sldMasterIdLst>
   <p:notesMasterIdLst>
-    <p:notesMasterId r:id="rId11"/>
+    <p:notesMasterId r:id="rId23"/>
   </p:notesMasterIdLst>
   <p:sldIdLst>
     <p:sldId id="292" r:id="rId2"/>
-    <p:sldId id="288" r:id="rId3"/>
-    <p:sldId id="293" r:id="rId4"/>
-    <p:sldId id="290" r:id="rId5"/>
-    <p:sldId id="291" r:id="rId6"/>
-    <p:sldId id="296" r:id="rId7"/>
-    <p:sldId id="298" r:id="rId8"/>
-    <p:sldId id="287" r:id="rId9"/>
-    <p:sldId id="297" r:id="rId10"/>
+    <p:sldId id="300" r:id="rId3"/>
+    <p:sldId id="301" r:id="rId4"/>
+    <p:sldId id="306" r:id="rId5"/>
+    <p:sldId id="288" r:id="rId6"/>
+    <p:sldId id="293" r:id="rId7"/>
+    <p:sldId id="305" r:id="rId8"/>
+    <p:sldId id="304" r:id="rId9"/>
+    <p:sldId id="307" r:id="rId10"/>
+    <p:sldId id="308" r:id="rId11"/>
+    <p:sldId id="309" r:id="rId12"/>
+    <p:sldId id="303" r:id="rId13"/>
+    <p:sldId id="310" r:id="rId14"/>
+    <p:sldId id="311" r:id="rId15"/>
+    <p:sldId id="290" r:id="rId16"/>
+    <p:sldId id="291" r:id="rId17"/>
+    <p:sldId id="296" r:id="rId18"/>
+    <p:sldId id="297" r:id="rId19"/>
+    <p:sldId id="298" r:id="rId20"/>
+    <p:sldId id="287" r:id="rId21"/>
+    <p:sldId id="299" r:id="rId22"/>
   </p:sldIdLst>
   <p:sldSz cx="10693400" cy="7562850"/>
   <p:notesSz cx="10693400" cy="7562850"/>
@@ -438,6 +450,191 @@
 </p:notes>
 </file>
 
+<file path=ppt/notesSlides/notesSlide2.xml><?xml version="1.0" encoding="utf-8"?>
+<p:notes xmlns:a="http://schemas.openxmlformats.org/drawingml/2006/main" xmlns:r="http://schemas.openxmlformats.org/officeDocument/2006/relationships" xmlns:p="http://schemas.openxmlformats.org/presentationml/2006/main">
+  <p:cSld>
+    <p:spTree>
+      <p:nvGrpSpPr>
+        <p:cNvPr id="1" name=""/>
+        <p:cNvGrpSpPr/>
+        <p:nvPr/>
+      </p:nvGrpSpPr>
+      <p:grpSpPr>
+        <a:xfrm>
+          <a:off x="0" y="0"/>
+          <a:ext cx="0" cy="0"/>
+          <a:chOff x="0" y="0"/>
+          <a:chExt cx="0" cy="0"/>
+        </a:xfrm>
+      </p:grpSpPr>
+      <p:sp>
+        <p:nvSpPr>
+          <p:cNvPr id="2" name="Slide Image Placeholder 1"/>
+          <p:cNvSpPr>
+            <a:spLocks noGrp="1" noRot="1" noChangeAspect="1"/>
+          </p:cNvSpPr>
+          <p:nvPr>
+            <p:ph type="sldImg"/>
+          </p:nvPr>
+        </p:nvSpPr>
+        <p:spPr>
+          <a:xfrm>
+            <a:off x="3543300" y="946150"/>
+            <a:ext cx="3606800" cy="2551113"/>
+          </a:xfrm>
+          <a:prstGeom prst="rect">
+            <a:avLst/>
+          </a:prstGeom>
+          <a:noFill/>
+          <a:ln w="12700">
+            <a:solidFill>
+              <a:prstClr val="black"/>
+            </a:solidFill>
+          </a:ln>
+        </p:spPr>
+      </p:sp>
+      <p:sp>
+        <p:nvSpPr>
+          <p:cNvPr id="3" name="Notes Placeholder 2"/>
+          <p:cNvSpPr>
+            <a:spLocks noGrp="1"/>
+          </p:cNvSpPr>
+          <p:nvPr>
+            <p:ph type="body" idx="1"/>
+          </p:nvPr>
+        </p:nvSpPr>
+        <p:spPr>
+          <a:xfrm>
+            <a:off x="1069975" y="3640138"/>
+            <a:ext cx="8553450" cy="2978150"/>
+          </a:xfrm>
+          <a:prstGeom prst="rect">
+            <a:avLst/>
+          </a:prstGeom>
+        </p:spPr>
+        <p:txBody>
+          <a:bodyPr/>
+          <a:lstStyle/>
+          <a:p>
+            <a:r>
+              <a:rPr lang="en-US" sz="1200" b="0" i="0" kern="1200" dirty="0">
+                <a:solidFill>
+                  <a:schemeClr val="tx1"/>
+                </a:solidFill>
+                <a:effectLst/>
+                <a:latin typeface="+mn-lt"/>
+                <a:ea typeface="+mn-ea"/>
+                <a:cs typeface="+mn-cs"/>
+              </a:rPr>
+              <a:t>The </a:t>
+            </a:r>
+            <a:r>
+              <a:rPr lang="en-US" dirty="0">
+                <a:effectLst/>
+              </a:rPr>
+              <a:t>describe</a:t>
+            </a:r>
+            <a:r>
+              <a:rPr lang="en-US" sz="1200" b="0" i="0" kern="1200" dirty="0">
+                <a:solidFill>
+                  <a:schemeClr val="tx1"/>
+                </a:solidFill>
+                <a:effectLst/>
+                <a:latin typeface="+mn-lt"/>
+                <a:ea typeface="+mn-ea"/>
+                <a:cs typeface="+mn-cs"/>
+              </a:rPr>
+              <a:t> container contains different blocks (</a:t>
+            </a:r>
+            <a:r>
+              <a:rPr lang="en-US" dirty="0">
+                <a:effectLst/>
+              </a:rPr>
+              <a:t>it</a:t>
+            </a:r>
+            <a:r>
+              <a:rPr lang="en-US" sz="1200" b="0" i="0" kern="1200" dirty="0">
+                <a:solidFill>
+                  <a:schemeClr val="tx1"/>
+                </a:solidFill>
+                <a:effectLst/>
+                <a:latin typeface="+mn-lt"/>
+                <a:ea typeface="+mn-ea"/>
+                <a:cs typeface="+mn-cs"/>
+              </a:rPr>
+              <a:t>, </a:t>
+            </a:r>
+            <a:r>
+              <a:rPr lang="en-US" dirty="0" err="1">
+                <a:effectLst/>
+              </a:rPr>
+              <a:t>beforeEach</a:t>
+            </a:r>
+            <a:r>
+              <a:rPr lang="en-US" sz="1200" b="0" i="0" kern="1200" dirty="0">
+                <a:solidFill>
+                  <a:schemeClr val="tx1"/>
+                </a:solidFill>
+                <a:effectLst/>
+                <a:latin typeface="+mn-lt"/>
+                <a:ea typeface="+mn-ea"/>
+                <a:cs typeface="+mn-cs"/>
+              </a:rPr>
+              <a:t>, </a:t>
+            </a:r>
+            <a:r>
+              <a:rPr lang="en-US" dirty="0" err="1">
+                <a:effectLst/>
+              </a:rPr>
+              <a:t>xit</a:t>
+            </a:r>
+            <a:r>
+              <a:rPr lang="en-US" sz="1200" b="0" i="0" kern="1200" dirty="0">
+                <a:solidFill>
+                  <a:schemeClr val="tx1"/>
+                </a:solidFill>
+                <a:effectLst/>
+                <a:latin typeface="+mn-lt"/>
+                <a:ea typeface="+mn-ea"/>
+                <a:cs typeface="+mn-cs"/>
+              </a:rPr>
+              <a:t>, etc.). </a:t>
+            </a:r>
+            <a:r>
+              <a:rPr lang="en-US" dirty="0" err="1">
+                <a:effectLst/>
+              </a:rPr>
+              <a:t>beforeEach</a:t>
+            </a:r>
+            <a:r>
+              <a:rPr lang="en-US" sz="1200" b="0" i="0" kern="1200" dirty="0">
+                <a:solidFill>
+                  <a:schemeClr val="tx1"/>
+                </a:solidFill>
+                <a:effectLst/>
+                <a:latin typeface="+mn-lt"/>
+                <a:ea typeface="+mn-ea"/>
+                <a:cs typeface="+mn-cs"/>
+              </a:rPr>
+              <a:t> runs before any other block. Other blocks do not depend on each other to run.</a:t>
+            </a:r>
+            <a:endParaRPr lang="en-NL" dirty="0"/>
+          </a:p>
+        </p:txBody>
+      </p:sp>
+    </p:spTree>
+    <p:extLst>
+      <p:ext uri="{BB962C8B-B14F-4D97-AF65-F5344CB8AC3E}">
+        <p14:creationId xmlns:p14="http://schemas.microsoft.com/office/powerpoint/2010/main" val="3902713685"/>
+      </p:ext>
+    </p:extLst>
+  </p:cSld>
+  <p:clrMapOvr>
+    <a:masterClrMapping/>
+  </p:clrMapOvr>
+</p:notes>
+</file>
+
 <file path=ppt/slideLayouts/slideLayout1.xml><?xml version="1.0" encoding="utf-8"?>
 <p:sldLayout xmlns:a="http://schemas.openxmlformats.org/drawingml/2006/main" xmlns:r="http://schemas.openxmlformats.org/officeDocument/2006/relationships" xmlns:p="http://schemas.openxmlformats.org/presentationml/2006/main" type="obj" preserve="1">
   <p:cSld name="Title Slide">
@@ -548,7 +745,7 @@
           <a:p>
             <a:fld id="{B496B693-9FDE-D34D-BA2D-87876F5E0558}" type="datetime1">
               <a:rPr lang="en-US" smtClean="0"/>
-              <a:t>1/26/22</a:t>
+              <a:t>2/6/22</a:t>
             </a:fld>
             <a:endParaRPr lang="en-US"/>
           </a:p>
@@ -707,7 +904,7 @@
           <a:p>
             <a:fld id="{2C668659-E1B9-F248-8B7A-62E98257FA2B}" type="datetime1">
               <a:rPr lang="en-US" smtClean="0"/>
-              <a:t>1/26/22</a:t>
+              <a:t>2/6/22</a:t>
             </a:fld>
             <a:endParaRPr lang="en-US"/>
           </a:p>
@@ -1185,7 +1382,7 @@
           <a:p>
             <a:fld id="{B6121E9A-9D8F-554C-B283-F41E0A321D9E}" type="datetime1">
               <a:rPr lang="en-US" smtClean="0"/>
-              <a:t>1/26/22</a:t>
+              <a:t>2/6/22</a:t>
             </a:fld>
             <a:endParaRPr lang="en-US"/>
           </a:p>
@@ -1310,7 +1507,7 @@
           <a:p>
             <a:fld id="{4830FFAC-C408-5B4A-A43B-C51D21E865D6}" type="datetime1">
               <a:rPr lang="en-US" smtClean="0"/>
-              <a:t>1/26/22</a:t>
+              <a:t>2/6/22</a:t>
             </a:fld>
             <a:endParaRPr lang="en-US"/>
           </a:p>
@@ -1406,7 +1603,7 @@
           <a:p>
             <a:fld id="{AAFBA3EB-6224-474F-84CA-5E91E4443D27}" type="datetime1">
               <a:rPr lang="en-US" smtClean="0"/>
-              <a:t>1/26/22</a:t>
+              <a:t>2/6/22</a:t>
             </a:fld>
             <a:endParaRPr lang="en-US"/>
           </a:p>
@@ -1640,7 +1837,7 @@
           <a:p>
             <a:fld id="{5A1FA41D-3A39-F741-AA79-3F454EC99F26}" type="datetime1">
               <a:rPr lang="en-US" smtClean="0"/>
-              <a:t>1/26/22</a:t>
+              <a:t>2/6/22</a:t>
             </a:fld>
             <a:endParaRPr lang="en-US"/>
           </a:p>
@@ -1885,7 +2082,7 @@
         <p:spPr>
           <a:xfrm>
             <a:off x="802005" y="2344483"/>
-            <a:ext cx="9089390" cy="423193"/>
+            <a:ext cx="9089390" cy="738664"/>
           </a:xfrm>
         </p:spPr>
         <p:txBody>
@@ -1894,34 +2091,9 @@
           <a:p>
             <a:pPr algn="ctr"/>
             <a:r>
-              <a:rPr lang="en-NL" dirty="0"/>
-              <a:t>Unittesting</a:t>
-            </a:r>
-          </a:p>
-        </p:txBody>
-      </p:sp>
-      <p:sp>
-        <p:nvSpPr>
-          <p:cNvPr id="3" name="Subtitle 2">
-            <a:extLst>
-              <a:ext uri="{FF2B5EF4-FFF2-40B4-BE49-F238E27FC236}">
-                <a16:creationId xmlns:a16="http://schemas.microsoft.com/office/drawing/2014/main" id="{4EBDD186-BED2-6741-B9A8-D1D240414D91}"/>
-              </a:ext>
-            </a:extLst>
-          </p:cNvPr>
-          <p:cNvSpPr>
-            <a:spLocks noGrp="1"/>
-          </p:cNvSpPr>
-          <p:nvPr>
-            <p:ph type="subTitle" idx="4"/>
-          </p:nvPr>
-        </p:nvSpPr>
-        <p:spPr/>
-        <p:txBody>
-          <a:bodyPr/>
-          <a:lstStyle/>
-          <a:p>
-            <a:endParaRPr lang="en-NL"/>
+              <a:rPr lang="en-NL" sz="4800" dirty="0"/>
+              <a:t>Testing</a:t>
+            </a:r>
           </a:p>
         </p:txBody>
       </p:sp>
@@ -1938,7 +2110,7 @@
 </p:sld>
 </file>
 
-<file path=ppt/slides/slide2.xml><?xml version="1.0" encoding="utf-8"?>
+<file path=ppt/slides/slide10.xml><?xml version="1.0" encoding="utf-8"?>
 <p:sld xmlns:a="http://schemas.openxmlformats.org/drawingml/2006/main" xmlns:r="http://schemas.openxmlformats.org/officeDocument/2006/relationships" xmlns:p="http://schemas.openxmlformats.org/presentationml/2006/main">
   <p:cSld>
     <p:spTree>
@@ -1955,126 +2127,12 @@
           <a:chExt cx="0" cy="0"/>
         </a:xfrm>
       </p:grpSpPr>
-      <p:sp>
-        <p:nvSpPr>
-          <p:cNvPr id="2" name="Title 1">
+      <p:pic>
+        <p:nvPicPr>
+          <p:cNvPr id="5" name="Picture 4" descr="Text&#10;&#10;Description automatically generated">
             <a:extLst>
               <a:ext uri="{FF2B5EF4-FFF2-40B4-BE49-F238E27FC236}">
-                <a16:creationId xmlns:a16="http://schemas.microsoft.com/office/drawing/2014/main" id="{4017007B-CD2B-B241-AB7A-3F75F0A7FEA6}"/>
-              </a:ext>
-            </a:extLst>
-          </p:cNvPr>
-          <p:cNvSpPr>
-            <a:spLocks noGrp="1"/>
-          </p:cNvSpPr>
-          <p:nvPr>
-            <p:ph type="title"/>
-          </p:nvPr>
-        </p:nvSpPr>
-        <p:spPr>
-          <a:xfrm>
-            <a:off x="460615" y="483077"/>
-            <a:ext cx="9772169" cy="423193"/>
-          </a:xfrm>
-        </p:spPr>
-        <p:txBody>
-          <a:bodyPr/>
-          <a:lstStyle/>
-          <a:p>
-            <a:pPr algn="ctr"/>
-            <a:r>
-              <a:rPr lang="en-NL" dirty="0"/>
-              <a:t>Jasmine</a:t>
-            </a:r>
-          </a:p>
-        </p:txBody>
-      </p:sp>
-      <p:sp>
-        <p:nvSpPr>
-          <p:cNvPr id="3" name="Text Placeholder 2">
-            <a:extLst>
-              <a:ext uri="{FF2B5EF4-FFF2-40B4-BE49-F238E27FC236}">
-                <a16:creationId xmlns:a16="http://schemas.microsoft.com/office/drawing/2014/main" id="{05F9B028-7FD4-A946-97F3-047882A7EECB}"/>
-              </a:ext>
-            </a:extLst>
-          </p:cNvPr>
-          <p:cNvSpPr>
-            <a:spLocks noGrp="1"/>
-          </p:cNvSpPr>
-          <p:nvPr>
-            <p:ph type="body" idx="1"/>
-          </p:nvPr>
-        </p:nvSpPr>
-        <p:spPr>
-          <a:xfrm>
-            <a:off x="1586617" y="2257425"/>
-            <a:ext cx="8895474" cy="3000821"/>
-          </a:xfrm>
-        </p:spPr>
-        <p:txBody>
-          <a:bodyPr/>
-          <a:lstStyle/>
-          <a:p>
-            <a:r>
-              <a:rPr lang="en-GB" b="1" dirty="0"/>
-              <a:t>Jasmine-core</a:t>
-            </a:r>
-            <a:r>
-              <a:rPr lang="en-GB" dirty="0"/>
-              <a:t> is the framework we are going to use to create our tests. </a:t>
-            </a:r>
-          </a:p>
-          <a:p>
-            <a:endParaRPr lang="en-GB" dirty="0"/>
-          </a:p>
-          <a:p>
-            <a:r>
-              <a:rPr lang="en-GB" b="1" dirty="0"/>
-              <a:t>Jasmine</a:t>
-            </a:r>
-            <a:r>
-              <a:rPr lang="en-GB" dirty="0"/>
-              <a:t> is a </a:t>
-            </a:r>
-            <a:r>
-              <a:rPr lang="en-GB" i="1" dirty="0"/>
-              <a:t>behaviour-driven development framework for testing.</a:t>
-            </a:r>
-          </a:p>
-          <a:p>
-            <a:endParaRPr lang="en-GB" i="1" dirty="0"/>
-          </a:p>
-          <a:p>
-            <a:r>
-              <a:rPr lang="en-GB" b="1" dirty="0"/>
-              <a:t>Jasmine</a:t>
-            </a:r>
-            <a:r>
-              <a:rPr lang="en-GB" dirty="0"/>
-              <a:t> also provides mocking.</a:t>
-            </a:r>
-            <a:endParaRPr lang="en-GB" i="1" dirty="0"/>
-          </a:p>
-          <a:p>
-            <a:endParaRPr lang="en-GB" i="1" dirty="0"/>
-          </a:p>
-          <a:p>
-            <a:endParaRPr lang="en-GB" i="1" dirty="0"/>
-          </a:p>
-          <a:p>
-            <a:endParaRPr lang="en-GB" b="1" dirty="0"/>
-          </a:p>
-          <a:p>
-            <a:endParaRPr lang="en-GB" dirty="0"/>
-          </a:p>
-        </p:txBody>
-      </p:sp>
-      <p:pic>
-        <p:nvPicPr>
-          <p:cNvPr id="4" name="Picture 3">
-            <a:extLst>
-              <a:ext uri="{FF2B5EF4-FFF2-40B4-BE49-F238E27FC236}">
-                <a16:creationId xmlns:a16="http://schemas.microsoft.com/office/drawing/2014/main" id="{AEB5BE40-FFB0-7046-A494-C3B47042C806}"/>
+                <a16:creationId xmlns:a16="http://schemas.microsoft.com/office/drawing/2014/main" id="{3F4320E1-053D-B147-BBC9-6056EB4EAD2F}"/>
               </a:ext>
             </a:extLst>
           </p:cNvPr>
@@ -2084,15 +2142,21 @@
           <p:nvPr/>
         </p:nvPicPr>
         <p:blipFill>
-          <a:blip r:embed="rId3"/>
+          <a:blip r:embed="rId2">
+            <a:extLst>
+              <a:ext uri="{28A0092B-C50C-407E-A947-70E740481C1C}">
+                <a14:useLocalDpi xmlns:a14="http://schemas.microsoft.com/office/drawing/2010/main" val="0"/>
+              </a:ext>
+            </a:extLst>
+          </a:blip>
           <a:stretch>
             <a:fillRect/>
           </a:stretch>
         </p:blipFill>
         <p:spPr>
           <a:xfrm>
-            <a:off x="2832100" y="4387090"/>
-            <a:ext cx="5207000" cy="1584416"/>
+            <a:off x="566742" y="0"/>
+            <a:ext cx="9559915" cy="7562850"/>
           </a:xfrm>
           <a:prstGeom prst="rect">
             <a:avLst/>
@@ -2102,7 +2166,7 @@
     </p:spTree>
     <p:extLst>
       <p:ext uri="{BB962C8B-B14F-4D97-AF65-F5344CB8AC3E}">
-        <p14:creationId xmlns:p14="http://schemas.microsoft.com/office/powerpoint/2010/main" val="1961420514"/>
+        <p14:creationId xmlns:p14="http://schemas.microsoft.com/office/powerpoint/2010/main" val="2702209633"/>
       </p:ext>
     </p:extLst>
   </p:cSld>
@@ -2112,7 +2176,7 @@
 </p:sld>
 </file>
 
-<file path=ppt/slides/slide3.xml><?xml version="1.0" encoding="utf-8"?>
+<file path=ppt/slides/slide11.xml><?xml version="1.0" encoding="utf-8"?>
 <p:sld xmlns:a="http://schemas.openxmlformats.org/drawingml/2006/main" xmlns:r="http://schemas.openxmlformats.org/officeDocument/2006/relationships" xmlns:p="http://schemas.openxmlformats.org/presentationml/2006/main">
   <p:cSld>
     <p:spTree>
@@ -2134,7 +2198,7 @@
           <p:cNvPr id="2" name="Title 1">
             <a:extLst>
               <a:ext uri="{FF2B5EF4-FFF2-40B4-BE49-F238E27FC236}">
-                <a16:creationId xmlns:a16="http://schemas.microsoft.com/office/drawing/2014/main" id="{EF550177-1AD9-3242-84B6-03DA878A27E1}"/>
+                <a16:creationId xmlns:a16="http://schemas.microsoft.com/office/drawing/2014/main" id="{1423A32D-982E-264B-99BD-C2C25C759B36}"/>
               </a:ext>
             </a:extLst>
           </p:cNvPr>
@@ -2158,7 +2222,7 @@
             <a:pPr algn="ctr"/>
             <a:r>
               <a:rPr lang="en-NL" dirty="0"/>
-              <a:t>Karma</a:t>
+              <a:t>Use Jasmine in Testbed</a:t>
             </a:r>
           </a:p>
         </p:txBody>
@@ -2168,7 +2232,7 @@
           <p:cNvPr id="3" name="Text Placeholder 2">
             <a:extLst>
               <a:ext uri="{FF2B5EF4-FFF2-40B4-BE49-F238E27FC236}">
-                <a16:creationId xmlns:a16="http://schemas.microsoft.com/office/drawing/2014/main" id="{62216F5A-A903-5240-B61A-936BFCD0D5E3}"/>
+                <a16:creationId xmlns:a16="http://schemas.microsoft.com/office/drawing/2014/main" id="{ACEF8883-3D12-E041-B612-F51D28113227}"/>
               </a:ext>
             </a:extLst>
           </p:cNvPr>
@@ -2181,8 +2245,8 @@
         </p:nvSpPr>
         <p:spPr>
           <a:xfrm>
-            <a:off x="1586617" y="2257425"/>
-            <a:ext cx="8895474" cy="1800493"/>
+            <a:off x="1" y="1495425"/>
+            <a:ext cx="10693400" cy="5701561"/>
           </a:xfrm>
         </p:spPr>
         <p:txBody>
@@ -2190,44 +2254,304 @@
           <a:lstStyle/>
           <a:p>
             <a:r>
-              <a:rPr lang="en-GB" b="1" dirty="0"/>
-              <a:t>Karma</a:t>
-            </a:r>
-            <a:r>
-              <a:rPr lang="en-GB" dirty="0"/>
-              <a:t> is a </a:t>
-            </a:r>
-            <a:r>
-              <a:rPr lang="en-GB" u="sng" dirty="0"/>
-              <a:t>test runner</a:t>
-            </a:r>
-            <a:r>
-              <a:rPr lang="en-GB" dirty="0"/>
-              <a:t>. It uses a configuration file in order to set the </a:t>
-            </a:r>
-            <a:r>
-              <a:rPr lang="en-GB" dirty="0" err="1"/>
-              <a:t>startup</a:t>
-            </a:r>
-            <a:r>
-              <a:rPr lang="en-GB" dirty="0"/>
-              <a:t> file, the reporters, the testing framework, the browser among other things.</a:t>
-            </a:r>
-          </a:p>
-          <a:p>
-            <a:endParaRPr lang="en-GB" dirty="0"/>
-          </a:p>
-          <a:p>
-            <a:r>
-              <a:rPr lang="en-GB" b="1" dirty="0"/>
-              <a:t>Karma</a:t>
-            </a:r>
-            <a:r>
-              <a:rPr lang="en-GB" dirty="0"/>
-              <a:t> opens up the browser in order to run the tests.</a:t>
-            </a:r>
-          </a:p>
-          <a:p>
+              <a:rPr lang="en-US" dirty="0"/>
+              <a:t>First, a few things that are important to know about Jasmine:</a:t>
+            </a:r>
+          </a:p>
+          <a:p>
+            <a:pPr marL="342900" indent="-342900">
+              <a:buFont typeface="Arial" panose="020B0604020202020204" pitchFamily="34" charset="0"/>
+              <a:buChar char="•"/>
+            </a:pPr>
+            <a:r>
+              <a:rPr lang="en-US" b="1" i="1" dirty="0"/>
+              <a:t>The describe-blocks </a:t>
+            </a:r>
+            <a:r>
+              <a:rPr lang="en-US" dirty="0"/>
+              <a:t>define a </a:t>
+            </a:r>
+            <a:r>
+              <a:rPr lang="en-US" i="1" dirty="0"/>
+              <a:t>test suite.</a:t>
+            </a:r>
+          </a:p>
+          <a:p>
+            <a:pPr marL="342900" indent="-342900">
+              <a:buFont typeface="Arial" panose="020B0604020202020204" pitchFamily="34" charset="0"/>
+              <a:buChar char="•"/>
+            </a:pPr>
+            <a:r>
+              <a:rPr lang="en-US" dirty="0"/>
+              <a:t>And each </a:t>
+            </a:r>
+            <a:r>
+              <a:rPr lang="en-US" b="1" i="1" dirty="0"/>
+              <a:t>it-block </a:t>
+            </a:r>
+            <a:r>
+              <a:rPr lang="en-US" dirty="0"/>
+              <a:t>is for an individual test.</a:t>
+            </a:r>
+          </a:p>
+          <a:p>
+            <a:pPr marL="342900" indent="-342900">
+              <a:buFont typeface="Arial" panose="020B0604020202020204" pitchFamily="34" charset="0"/>
+              <a:buChar char="•"/>
+            </a:pPr>
+            <a:endParaRPr lang="en-US" b="1" i="1" dirty="0"/>
+          </a:p>
+          <a:p>
+            <a:pPr marL="342900" indent="-342900">
+              <a:buFont typeface="Arial" panose="020B0604020202020204" pitchFamily="34" charset="0"/>
+              <a:buChar char="•"/>
+            </a:pPr>
+            <a:r>
+              <a:rPr lang="en-US" b="1" i="1" dirty="0" err="1"/>
+              <a:t>beforeEach</a:t>
+            </a:r>
+            <a:r>
+              <a:rPr lang="en-US" dirty="0"/>
+              <a:t> runs before each test and is used for the setup part of a test.</a:t>
+            </a:r>
+          </a:p>
+          <a:p>
+            <a:pPr marL="342900" indent="-342900">
+              <a:buFont typeface="Arial" panose="020B0604020202020204" pitchFamily="34" charset="0"/>
+              <a:buChar char="•"/>
+            </a:pPr>
+            <a:endParaRPr lang="en-US" b="1" i="1" dirty="0"/>
+          </a:p>
+          <a:p>
+            <a:pPr marL="342900" indent="-342900">
+              <a:buFont typeface="Arial" panose="020B0604020202020204" pitchFamily="34" charset="0"/>
+              <a:buChar char="•"/>
+            </a:pPr>
+            <a:r>
+              <a:rPr lang="en-US" b="1" i="1" dirty="0" err="1"/>
+              <a:t>afterEach</a:t>
+            </a:r>
+            <a:r>
+              <a:rPr lang="en-US" dirty="0"/>
+              <a:t> runs after each test and is used for the teardown part of a test.</a:t>
+            </a:r>
+          </a:p>
+          <a:p>
+            <a:pPr marL="342900" indent="-342900">
+              <a:buFont typeface="Arial" panose="020B0604020202020204" pitchFamily="34" charset="0"/>
+              <a:buChar char="•"/>
+            </a:pPr>
+            <a:r>
+              <a:rPr lang="en-US" dirty="0"/>
+              <a:t>You can also use </a:t>
+            </a:r>
+            <a:r>
+              <a:rPr lang="en-US" b="1" i="1" dirty="0" err="1"/>
+              <a:t>beforeAll</a:t>
+            </a:r>
+            <a:r>
+              <a:rPr lang="en-US" dirty="0"/>
+              <a:t> and </a:t>
+            </a:r>
+            <a:r>
+              <a:rPr lang="en-US" b="1" i="1" dirty="0" err="1"/>
+              <a:t>afterAll</a:t>
+            </a:r>
+            <a:r>
+              <a:rPr lang="en-US" dirty="0"/>
+              <a:t>, and these run once before or after all tests.</a:t>
+            </a:r>
+          </a:p>
+          <a:p>
+            <a:pPr marL="342900" indent="-342900">
+              <a:buFont typeface="Arial" panose="020B0604020202020204" pitchFamily="34" charset="0"/>
+              <a:buChar char="•"/>
+            </a:pPr>
+            <a:endParaRPr lang="en-US" b="1" i="1" dirty="0"/>
+          </a:p>
+          <a:p>
+            <a:pPr marL="342900" indent="-342900">
+              <a:buFont typeface="Arial" panose="020B0604020202020204" pitchFamily="34" charset="0"/>
+              <a:buChar char="•"/>
+            </a:pPr>
+            <a:r>
+              <a:rPr lang="en-US" b="1" i="1" dirty="0"/>
+              <a:t>You test an assertion </a:t>
+            </a:r>
+            <a:r>
+              <a:rPr lang="en-US" dirty="0"/>
+              <a:t>in Jasmine with </a:t>
+            </a:r>
+            <a:r>
+              <a:rPr lang="en-US" b="1" i="1" dirty="0"/>
+              <a:t>expect</a:t>
+            </a:r>
+            <a:r>
+              <a:rPr lang="en-US" dirty="0"/>
+              <a:t> and using a matcher like: </a:t>
+            </a:r>
+            <a:r>
+              <a:rPr lang="en-US" dirty="0" err="1"/>
+              <a:t>toBeDefined</a:t>
+            </a:r>
+            <a:r>
+              <a:rPr lang="en-US" dirty="0"/>
+              <a:t>, </a:t>
+            </a:r>
+            <a:r>
+              <a:rPr lang="en-US" dirty="0" err="1"/>
+              <a:t>toBeTruthy</a:t>
+            </a:r>
+            <a:r>
+              <a:rPr lang="en-US" dirty="0"/>
+              <a:t>, </a:t>
+            </a:r>
+            <a:r>
+              <a:rPr lang="en-US" dirty="0" err="1"/>
+              <a:t>toContain</a:t>
+            </a:r>
+            <a:r>
+              <a:rPr lang="en-US" dirty="0"/>
+              <a:t>, </a:t>
+            </a:r>
+            <a:r>
+              <a:rPr lang="en-US" dirty="0" err="1"/>
+              <a:t>toEqual</a:t>
+            </a:r>
+            <a:r>
+              <a:rPr lang="en-US" dirty="0"/>
+              <a:t>, </a:t>
+            </a:r>
+            <a:r>
+              <a:rPr lang="en-US" dirty="0" err="1"/>
+              <a:t>toThrow</a:t>
+            </a:r>
+            <a:r>
+              <a:rPr lang="en-US" dirty="0"/>
+              <a:t>, </a:t>
+            </a:r>
+            <a:r>
+              <a:rPr lang="en-US" dirty="0" err="1"/>
+              <a:t>toBeNull</a:t>
+            </a:r>
+            <a:r>
+              <a:rPr lang="en-US" dirty="0"/>
+              <a:t>, </a:t>
+            </a:r>
+          </a:p>
+          <a:p>
+            <a:r>
+              <a:rPr lang="en-US" dirty="0"/>
+              <a:t>    … For example: </a:t>
+            </a:r>
+            <a:r>
+              <a:rPr lang="en-US" i="1" dirty="0">
+                <a:solidFill>
+                  <a:srgbClr val="C00000"/>
+                </a:solidFill>
+              </a:rPr>
+              <a:t>expect(</a:t>
+            </a:r>
+            <a:r>
+              <a:rPr lang="en-US" i="1" dirty="0" err="1">
+                <a:solidFill>
+                  <a:srgbClr val="C00000"/>
+                </a:solidFill>
+              </a:rPr>
+              <a:t>myValue</a:t>
+            </a:r>
+            <a:r>
+              <a:rPr lang="en-US" i="1" dirty="0">
+                <a:solidFill>
+                  <a:srgbClr val="C00000"/>
+                </a:solidFill>
+              </a:rPr>
+              <a:t>).</a:t>
+            </a:r>
+            <a:r>
+              <a:rPr lang="en-US" i="1" dirty="0" err="1">
+                <a:solidFill>
+                  <a:srgbClr val="C00000"/>
+                </a:solidFill>
+              </a:rPr>
+              <a:t>toBeGreaterThan</a:t>
+            </a:r>
+            <a:r>
+              <a:rPr lang="en-US" i="1" dirty="0">
+                <a:solidFill>
+                  <a:srgbClr val="C00000"/>
+                </a:solidFill>
+              </a:rPr>
+              <a:t>(3);</a:t>
+            </a:r>
+          </a:p>
+          <a:p>
+            <a:pPr marL="342900" indent="-342900">
+              <a:buFont typeface="Arial" panose="020B0604020202020204" pitchFamily="34" charset="0"/>
+              <a:buChar char="•"/>
+            </a:pPr>
+            <a:endParaRPr lang="en-US" dirty="0"/>
+          </a:p>
+          <a:p>
+            <a:pPr marL="342900" indent="-342900">
+              <a:buFont typeface="Arial" panose="020B0604020202020204" pitchFamily="34" charset="0"/>
+              <a:buChar char="•"/>
+            </a:pPr>
+            <a:r>
+              <a:rPr lang="en-US" dirty="0"/>
+              <a:t>You can do negative assertion with </a:t>
+            </a:r>
+            <a:r>
+              <a:rPr lang="en-US" i="1" dirty="0"/>
+              <a:t>not</a:t>
+            </a:r>
+            <a:r>
+              <a:rPr lang="en-US" dirty="0"/>
+              <a:t>: expect(</a:t>
+            </a:r>
+            <a:r>
+              <a:rPr lang="en-US" dirty="0" err="1"/>
+              <a:t>myValue</a:t>
+            </a:r>
+            <a:r>
+              <a:rPr lang="en-US" b="1" dirty="0"/>
+              <a:t>).</a:t>
+            </a:r>
+            <a:r>
+              <a:rPr lang="en-US" b="1" dirty="0" err="1"/>
+              <a:t>not.</a:t>
+            </a:r>
+            <a:r>
+              <a:rPr lang="en-US" dirty="0" err="1"/>
+              <a:t>toBeGreaterThan</a:t>
+            </a:r>
+            <a:r>
+              <a:rPr lang="en-US" dirty="0"/>
+              <a:t>(3);</a:t>
+            </a:r>
+          </a:p>
+          <a:p>
+            <a:pPr marL="342900" indent="-342900">
+              <a:buFont typeface="Arial" panose="020B0604020202020204" pitchFamily="34" charset="0"/>
+              <a:buChar char="•"/>
+            </a:pPr>
+            <a:endParaRPr lang="en-US" dirty="0"/>
+          </a:p>
+          <a:p>
+            <a:pPr marL="342900" indent="-342900">
+              <a:buFont typeface="Arial" panose="020B0604020202020204" pitchFamily="34" charset="0"/>
+              <a:buChar char="•"/>
+            </a:pPr>
+            <a:r>
+              <a:rPr lang="en-US" dirty="0"/>
+              <a:t>You can also define custom matchers.</a:t>
+            </a:r>
+          </a:p>
+          <a:p>
+            <a:pPr marL="342900" indent="-342900">
+              <a:buFont typeface="Arial" panose="020B0604020202020204" pitchFamily="34" charset="0"/>
+              <a:buChar char="•"/>
+            </a:pPr>
             <a:endParaRPr lang="en-NL" dirty="0"/>
           </a:p>
         </p:txBody>
@@ -2235,7 +2559,7 @@
     </p:spTree>
     <p:extLst>
       <p:ext uri="{BB962C8B-B14F-4D97-AF65-F5344CB8AC3E}">
-        <p14:creationId xmlns:p14="http://schemas.microsoft.com/office/powerpoint/2010/main" val="945828404"/>
+        <p14:creationId xmlns:p14="http://schemas.microsoft.com/office/powerpoint/2010/main" val="1892731922"/>
       </p:ext>
     </p:extLst>
   </p:cSld>
@@ -2245,7 +2569,7 @@
 </p:sld>
 </file>
 
-<file path=ppt/slides/slide4.xml><?xml version="1.0" encoding="utf-8"?>
+<file path=ppt/slides/slide12.xml><?xml version="1.0" encoding="utf-8"?>
 <p:sld xmlns:a="http://schemas.openxmlformats.org/drawingml/2006/main" xmlns:r="http://schemas.openxmlformats.org/officeDocument/2006/relationships" xmlns:p="http://schemas.openxmlformats.org/presentationml/2006/main">
   <p:cSld>
     <p:spTree>
@@ -2267,6 +2591,449 @@
           <p:cNvPr id="2" name="Title 1">
             <a:extLst>
               <a:ext uri="{FF2B5EF4-FFF2-40B4-BE49-F238E27FC236}">
+                <a16:creationId xmlns:a16="http://schemas.microsoft.com/office/drawing/2014/main" id="{E4B88C1A-47F7-6346-92C0-4709CBD67064}"/>
+              </a:ext>
+            </a:extLst>
+          </p:cNvPr>
+          <p:cNvSpPr>
+            <a:spLocks noGrp="1"/>
+          </p:cNvSpPr>
+          <p:nvPr>
+            <p:ph type="title"/>
+          </p:nvPr>
+        </p:nvSpPr>
+        <p:spPr>
+          <a:xfrm>
+            <a:off x="460615" y="483077"/>
+            <a:ext cx="9772169" cy="423193"/>
+          </a:xfrm>
+        </p:spPr>
+        <p:txBody>
+          <a:bodyPr/>
+          <a:lstStyle/>
+          <a:p>
+            <a:pPr algn="ctr"/>
+            <a:r>
+              <a:rPr lang="en-NL" dirty="0"/>
+              <a:t>beforeEach in Testbed ?</a:t>
+            </a:r>
+          </a:p>
+        </p:txBody>
+      </p:sp>
+      <p:sp>
+        <p:nvSpPr>
+          <p:cNvPr id="3" name="Text Placeholder 2">
+            <a:extLst>
+              <a:ext uri="{FF2B5EF4-FFF2-40B4-BE49-F238E27FC236}">
+                <a16:creationId xmlns:a16="http://schemas.microsoft.com/office/drawing/2014/main" id="{46FC7498-9A4B-9B45-B058-A5CE22B9273F}"/>
+              </a:ext>
+            </a:extLst>
+          </p:cNvPr>
+          <p:cNvSpPr>
+            <a:spLocks noGrp="1"/>
+          </p:cNvSpPr>
+          <p:nvPr>
+            <p:ph type="body" idx="1"/>
+          </p:nvPr>
+        </p:nvSpPr>
+        <p:spPr>
+          <a:xfrm>
+            <a:off x="1460500" y="1615185"/>
+            <a:ext cx="8895474" cy="3000821"/>
+          </a:xfrm>
+        </p:spPr>
+        <p:txBody>
+          <a:bodyPr/>
+          <a:lstStyle/>
+          <a:p>
+            <a:r>
+              <a:rPr lang="en-US" dirty="0"/>
+              <a:t>This is the only block that </a:t>
+            </a:r>
+            <a:r>
+              <a:rPr lang="en-US" i="1" dirty="0"/>
+              <a:t>runs before any other test.</a:t>
+            </a:r>
+          </a:p>
+          <a:p>
+            <a:endParaRPr lang="en-US" dirty="0"/>
+          </a:p>
+          <a:p>
+            <a:r>
+              <a:rPr lang="en-US" dirty="0"/>
+              <a:t>You need to configure the </a:t>
+            </a:r>
+            <a:r>
+              <a:rPr lang="en-US" dirty="0" err="1"/>
+              <a:t>TestBed</a:t>
+            </a:r>
+            <a:r>
+              <a:rPr lang="en-US" dirty="0"/>
+              <a:t> before each test, adding any components, modules and services you need for the test. </a:t>
+            </a:r>
+          </a:p>
+          <a:p>
+            <a:r>
+              <a:rPr lang="en-US" dirty="0"/>
+              <a:t>It's just like </a:t>
+            </a:r>
+            <a:r>
+              <a:rPr lang="en-US" i="1" dirty="0"/>
+              <a:t>configuring a regular @</a:t>
+            </a:r>
+            <a:r>
+              <a:rPr lang="en-US" i="1" dirty="0" err="1"/>
+              <a:t>NgModule</a:t>
+            </a:r>
+            <a:r>
+              <a:rPr lang="en-US" i="1" dirty="0"/>
+              <a:t> </a:t>
+            </a:r>
+            <a:r>
+              <a:rPr lang="en-US" dirty="0"/>
+              <a:t>from scratch, but you just add what you need.</a:t>
+            </a:r>
+          </a:p>
+          <a:p>
+            <a:endParaRPr lang="en-US" dirty="0"/>
+          </a:p>
+          <a:p>
+            <a:r>
+              <a:rPr lang="en-US" dirty="0"/>
+              <a:t>The </a:t>
+            </a:r>
+            <a:r>
+              <a:rPr lang="en-US" i="1" dirty="0" err="1">
+                <a:solidFill>
+                  <a:srgbClr val="C00000"/>
+                </a:solidFill>
+              </a:rPr>
+              <a:t>compileComponents</a:t>
+            </a:r>
+            <a:r>
+              <a:rPr lang="en-US" dirty="0"/>
+              <a:t> object is called to compile your component’s resources like the </a:t>
+            </a:r>
+            <a:r>
+              <a:rPr lang="en-US" b="1" i="1" dirty="0"/>
+              <a:t>template</a:t>
+            </a:r>
+            <a:r>
+              <a:rPr lang="en-US" dirty="0"/>
+              <a:t>, </a:t>
+            </a:r>
+            <a:r>
+              <a:rPr lang="en-US" b="1" i="1" dirty="0"/>
+              <a:t>styles</a:t>
+            </a:r>
+          </a:p>
+          <a:p>
+            <a:endParaRPr lang="en-NL" dirty="0"/>
+          </a:p>
+        </p:txBody>
+      </p:sp>
+      <p:pic>
+        <p:nvPicPr>
+          <p:cNvPr id="5" name="Picture 4" descr="Graphical user interface, text, application, email&#10;&#10;Description automatically generated">
+            <a:extLst>
+              <a:ext uri="{FF2B5EF4-FFF2-40B4-BE49-F238E27FC236}">
+                <a16:creationId xmlns:a16="http://schemas.microsoft.com/office/drawing/2014/main" id="{574F230D-6FEA-E346-93FD-2620DFA6448F}"/>
+              </a:ext>
+            </a:extLst>
+          </p:cNvPr>
+          <p:cNvPicPr>
+            <a:picLocks noChangeAspect="1"/>
+          </p:cNvPicPr>
+          <p:nvPr/>
+        </p:nvPicPr>
+        <p:blipFill>
+          <a:blip r:embed="rId2">
+            <a:extLst>
+              <a:ext uri="{28A0092B-C50C-407E-A947-70E740481C1C}">
+                <a14:useLocalDpi xmlns:a14="http://schemas.microsoft.com/office/drawing/2010/main" val="0"/>
+              </a:ext>
+            </a:extLst>
+          </a:blip>
+          <a:stretch>
+            <a:fillRect/>
+          </a:stretch>
+        </p:blipFill>
+        <p:spPr>
+          <a:xfrm>
+            <a:off x="2908300" y="4382971"/>
+            <a:ext cx="5308600" cy="3111500"/>
+          </a:xfrm>
+          <a:prstGeom prst="rect">
+            <a:avLst/>
+          </a:prstGeom>
+        </p:spPr>
+      </p:pic>
+    </p:spTree>
+    <p:extLst>
+      <p:ext uri="{BB962C8B-B14F-4D97-AF65-F5344CB8AC3E}">
+        <p14:creationId xmlns:p14="http://schemas.microsoft.com/office/powerpoint/2010/main" val="198602521"/>
+      </p:ext>
+    </p:extLst>
+  </p:cSld>
+  <p:clrMapOvr>
+    <a:masterClrMapping/>
+  </p:clrMapOvr>
+</p:sld>
+</file>
+
+<file path=ppt/slides/slide13.xml><?xml version="1.0" encoding="utf-8"?>
+<p:sld xmlns:a="http://schemas.openxmlformats.org/drawingml/2006/main" xmlns:r="http://schemas.openxmlformats.org/officeDocument/2006/relationships" xmlns:p="http://schemas.openxmlformats.org/presentationml/2006/main">
+  <p:cSld>
+    <p:spTree>
+      <p:nvGrpSpPr>
+        <p:cNvPr id="1" name=""/>
+        <p:cNvGrpSpPr/>
+        <p:nvPr/>
+      </p:nvGrpSpPr>
+      <p:grpSpPr>
+        <a:xfrm>
+          <a:off x="0" y="0"/>
+          <a:ext cx="0" cy="0"/>
+          <a:chOff x="0" y="0"/>
+          <a:chExt cx="0" cy="0"/>
+        </a:xfrm>
+      </p:grpSpPr>
+      <p:sp>
+        <p:nvSpPr>
+          <p:cNvPr id="2" name="Title 1">
+            <a:extLst>
+              <a:ext uri="{FF2B5EF4-FFF2-40B4-BE49-F238E27FC236}">
+                <a16:creationId xmlns:a16="http://schemas.microsoft.com/office/drawing/2014/main" id="{80D843FF-D17B-754A-9AEE-60B495065C96}"/>
+              </a:ext>
+            </a:extLst>
+          </p:cNvPr>
+          <p:cNvSpPr>
+            <a:spLocks noGrp="1"/>
+          </p:cNvSpPr>
+          <p:nvPr>
+            <p:ph type="title"/>
+          </p:nvPr>
+        </p:nvSpPr>
+        <p:spPr>
+          <a:xfrm>
+            <a:off x="460615" y="483077"/>
+            <a:ext cx="9772169" cy="423193"/>
+          </a:xfrm>
+        </p:spPr>
+        <p:txBody>
+          <a:bodyPr/>
+          <a:lstStyle/>
+          <a:p>
+            <a:pPr algn="ctr"/>
+            <a:r>
+              <a:rPr lang="en-US" dirty="0"/>
+              <a:t>component fixture </a:t>
+            </a:r>
+            <a:endParaRPr lang="en-NL" dirty="0"/>
+          </a:p>
+        </p:txBody>
+      </p:sp>
+      <p:sp>
+        <p:nvSpPr>
+          <p:cNvPr id="3" name="Text Placeholder 2">
+            <a:extLst>
+              <a:ext uri="{FF2B5EF4-FFF2-40B4-BE49-F238E27FC236}">
+                <a16:creationId xmlns:a16="http://schemas.microsoft.com/office/drawing/2014/main" id="{A1019FCE-184A-C24E-8882-5D86682D5463}"/>
+              </a:ext>
+            </a:extLst>
+          </p:cNvPr>
+          <p:cNvSpPr>
+            <a:spLocks noGrp="1"/>
+          </p:cNvSpPr>
+          <p:nvPr>
+            <p:ph type="body" idx="1"/>
+          </p:nvPr>
+        </p:nvSpPr>
+        <p:spPr>
+          <a:xfrm>
+            <a:off x="1586617" y="2257425"/>
+            <a:ext cx="8895474" cy="1200329"/>
+          </a:xfrm>
+        </p:spPr>
+        <p:txBody>
+          <a:bodyPr/>
+          <a:lstStyle/>
+          <a:p>
+            <a:r>
+              <a:rPr lang="en-US" dirty="0"/>
+              <a:t>You can create a component fixture with </a:t>
+            </a:r>
+            <a:r>
+              <a:rPr lang="en-US" dirty="0" err="1"/>
+              <a:t>TestBed.createComponent</a:t>
+            </a:r>
+            <a:r>
+              <a:rPr lang="en-US" dirty="0"/>
+              <a:t>. </a:t>
+            </a:r>
+          </a:p>
+          <a:p>
+            <a:endParaRPr lang="en-US" dirty="0"/>
+          </a:p>
+          <a:p>
+            <a:r>
+              <a:rPr lang="en-US" dirty="0"/>
+              <a:t>Fixtures have access to a </a:t>
+            </a:r>
+            <a:r>
+              <a:rPr lang="en-US" dirty="0" err="1"/>
+              <a:t>debugElement</a:t>
+            </a:r>
+            <a:r>
+              <a:rPr lang="en-US" dirty="0"/>
+              <a:t>, which will give you access to the internals of the component fixture.</a:t>
+            </a:r>
+            <a:endParaRPr lang="en-NL" dirty="0"/>
+          </a:p>
+        </p:txBody>
+      </p:sp>
+    </p:spTree>
+    <p:extLst>
+      <p:ext uri="{BB962C8B-B14F-4D97-AF65-F5344CB8AC3E}">
+        <p14:creationId xmlns:p14="http://schemas.microsoft.com/office/powerpoint/2010/main" val="3238451826"/>
+      </p:ext>
+    </p:extLst>
+  </p:cSld>
+  <p:clrMapOvr>
+    <a:masterClrMapping/>
+  </p:clrMapOvr>
+</p:sld>
+</file>
+
+<file path=ppt/slides/slide14.xml><?xml version="1.0" encoding="utf-8"?>
+<p:sld xmlns:a="http://schemas.openxmlformats.org/drawingml/2006/main" xmlns:r="http://schemas.openxmlformats.org/officeDocument/2006/relationships" xmlns:p="http://schemas.openxmlformats.org/presentationml/2006/main">
+  <p:cSld>
+    <p:spTree>
+      <p:nvGrpSpPr>
+        <p:cNvPr id="1" name=""/>
+        <p:cNvGrpSpPr/>
+        <p:nvPr/>
+      </p:nvGrpSpPr>
+      <p:grpSpPr>
+        <a:xfrm>
+          <a:off x="0" y="0"/>
+          <a:ext cx="0" cy="0"/>
+          <a:chOff x="0" y="0"/>
+          <a:chExt cx="0" cy="0"/>
+        </a:xfrm>
+      </p:grpSpPr>
+      <p:sp>
+        <p:nvSpPr>
+          <p:cNvPr id="2" name="Title 1">
+            <a:extLst>
+              <a:ext uri="{FF2B5EF4-FFF2-40B4-BE49-F238E27FC236}">
+                <a16:creationId xmlns:a16="http://schemas.microsoft.com/office/drawing/2014/main" id="{AF87AABD-3547-A442-AF26-7C9B39DF137C}"/>
+              </a:ext>
+            </a:extLst>
+          </p:cNvPr>
+          <p:cNvSpPr>
+            <a:spLocks noGrp="1"/>
+          </p:cNvSpPr>
+          <p:nvPr>
+            <p:ph type="title"/>
+          </p:nvPr>
+        </p:nvSpPr>
+        <p:spPr>
+          <a:xfrm>
+            <a:off x="460615" y="483077"/>
+            <a:ext cx="9772169" cy="423193"/>
+          </a:xfrm>
+        </p:spPr>
+        <p:txBody>
+          <a:bodyPr/>
+          <a:lstStyle/>
+          <a:p>
+            <a:pPr algn="ctr"/>
+            <a:r>
+              <a:rPr lang="en-US" dirty="0"/>
+              <a:t>Change detection in unit tests</a:t>
+            </a:r>
+            <a:endParaRPr lang="en-NL" dirty="0"/>
+          </a:p>
+        </p:txBody>
+      </p:sp>
+      <p:sp>
+        <p:nvSpPr>
+          <p:cNvPr id="3" name="Text Placeholder 2">
+            <a:extLst>
+              <a:ext uri="{FF2B5EF4-FFF2-40B4-BE49-F238E27FC236}">
+                <a16:creationId xmlns:a16="http://schemas.microsoft.com/office/drawing/2014/main" id="{A77C93B3-EB00-4248-B6E1-7D113FAEF7E7}"/>
+              </a:ext>
+            </a:extLst>
+          </p:cNvPr>
+          <p:cNvSpPr>
+            <a:spLocks noGrp="1"/>
+          </p:cNvSpPr>
+          <p:nvPr>
+            <p:ph type="body" idx="1"/>
+          </p:nvPr>
+        </p:nvSpPr>
+        <p:spPr>
+          <a:xfrm>
+            <a:off x="1586617" y="2257425"/>
+            <a:ext cx="8895474" cy="600164"/>
+          </a:xfrm>
+        </p:spPr>
+        <p:txBody>
+          <a:bodyPr/>
+          <a:lstStyle/>
+          <a:p>
+            <a:r>
+              <a:rPr lang="en-US" dirty="0"/>
+              <a:t>Change detection isn’t done automatically, so you’ll call </a:t>
+            </a:r>
+            <a:r>
+              <a:rPr lang="en-US" dirty="0" err="1"/>
+              <a:t>detectChanges</a:t>
+            </a:r>
+            <a:r>
+              <a:rPr lang="en-US" dirty="0"/>
+              <a:t> on a fixture to tell Angular to run change detection.</a:t>
+            </a:r>
+            <a:endParaRPr lang="en-NL" dirty="0"/>
+          </a:p>
+        </p:txBody>
+      </p:sp>
+    </p:spTree>
+    <p:extLst>
+      <p:ext uri="{BB962C8B-B14F-4D97-AF65-F5344CB8AC3E}">
+        <p14:creationId xmlns:p14="http://schemas.microsoft.com/office/powerpoint/2010/main" val="4293607683"/>
+      </p:ext>
+    </p:extLst>
+  </p:cSld>
+  <p:clrMapOvr>
+    <a:masterClrMapping/>
+  </p:clrMapOvr>
+</p:sld>
+</file>
+
+<file path=ppt/slides/slide15.xml><?xml version="1.0" encoding="utf-8"?>
+<p:sld xmlns:a="http://schemas.openxmlformats.org/drawingml/2006/main" xmlns:r="http://schemas.openxmlformats.org/officeDocument/2006/relationships" xmlns:p="http://schemas.openxmlformats.org/presentationml/2006/main">
+  <p:cSld>
+    <p:spTree>
+      <p:nvGrpSpPr>
+        <p:cNvPr id="1" name=""/>
+        <p:cNvGrpSpPr/>
+        <p:nvPr/>
+      </p:nvGrpSpPr>
+      <p:grpSpPr>
+        <a:xfrm>
+          <a:off x="0" y="0"/>
+          <a:ext cx="0" cy="0"/>
+          <a:chOff x="0" y="0"/>
+          <a:chExt cx="0" cy="0"/>
+        </a:xfrm>
+      </p:grpSpPr>
+      <p:sp>
+        <p:nvSpPr>
+          <p:cNvPr id="2" name="Title 1">
+            <a:extLst>
+              <a:ext uri="{FF2B5EF4-FFF2-40B4-BE49-F238E27FC236}">
                 <a16:creationId xmlns:a16="http://schemas.microsoft.com/office/drawing/2014/main" id="{392FC1CE-2F8F-DA45-B12E-0555C921E26E}"/>
               </a:ext>
             </a:extLst>
@@ -2347,7 +3114,7 @@
 </p:sld>
 </file>
 
-<file path=ppt/slides/slide5.xml><?xml version="1.0" encoding="utf-8"?>
+<file path=ppt/slides/slide16.xml><?xml version="1.0" encoding="utf-8"?>
 <p:sld xmlns:a="http://schemas.openxmlformats.org/drawingml/2006/main" xmlns:r="http://schemas.openxmlformats.org/officeDocument/2006/relationships" xmlns:p="http://schemas.openxmlformats.org/presentationml/2006/main">
   <p:cSld>
     <p:spTree>
@@ -2463,7 +3230,7 @@
 </p:sld>
 </file>
 
-<file path=ppt/slides/slide6.xml><?xml version="1.0" encoding="utf-8"?>
+<file path=ppt/slides/slide17.xml><?xml version="1.0" encoding="utf-8"?>
 <p:sld xmlns:a="http://schemas.openxmlformats.org/drawingml/2006/main" xmlns:r="http://schemas.openxmlformats.org/officeDocument/2006/relationships" xmlns:p="http://schemas.openxmlformats.org/presentationml/2006/main">
   <p:cSld>
     <p:spTree>
@@ -2532,8 +3299,8 @@
         </p:nvSpPr>
         <p:spPr>
           <a:xfrm>
-            <a:off x="1460500" y="3248025"/>
-            <a:ext cx="8895474" cy="900246"/>
+            <a:off x="241300" y="3248025"/>
+            <a:ext cx="10114674" cy="2400657"/>
           </a:xfrm>
         </p:spPr>
         <p:txBody>
@@ -2541,48 +3308,110 @@
           <a:lstStyle/>
           <a:p>
             <a:r>
-              <a:rPr lang="en-GB" dirty="0"/>
+              <a:rPr lang="en-GB" b="1" dirty="0">
+                <a:solidFill>
+                  <a:srgbClr val="00B0F0"/>
+                </a:solidFill>
+                <a:hlinkClick r:id="rId2">
+                  <a:extLst>
+                    <a:ext uri="{A12FA001-AC4F-418D-AE19-62706E023703}">
+                      <ahyp:hlinkClr xmlns:ahyp="http://schemas.microsoft.com/office/drawing/2018/hyperlinkcolor" val="tx"/>
+                    </a:ext>
+                  </a:extLst>
+                </a:hlinkClick>
+              </a:rPr>
+              <a:t>https://codecraft.tv/courses/angular/unit-testing/mocks-and-spies/</a:t>
+            </a:r>
+            <a:endParaRPr lang="en-GB" b="1" dirty="0">
+              <a:solidFill>
+                <a:srgbClr val="00B0F0"/>
+              </a:solidFill>
+            </a:endParaRPr>
+          </a:p>
+          <a:p>
+            <a:endParaRPr lang="en-GB" b="1" dirty="0">
+              <a:solidFill>
+                <a:srgbClr val="00B0F0"/>
+              </a:solidFill>
+            </a:endParaRPr>
+          </a:p>
+          <a:p>
+            <a:endParaRPr lang="en-GB" b="1" dirty="0">
+              <a:solidFill>
+                <a:srgbClr val="00B0F0"/>
+              </a:solidFill>
+            </a:endParaRPr>
+          </a:p>
+          <a:p>
+            <a:endParaRPr lang="en-GB" b="1" dirty="0">
+              <a:solidFill>
+                <a:srgbClr val="00B0F0"/>
+              </a:solidFill>
+            </a:endParaRPr>
+          </a:p>
+          <a:p>
+            <a:r>
+              <a:rPr lang="en-GB" b="1" dirty="0">
+                <a:solidFill>
+                  <a:srgbClr val="00B0F0"/>
+                </a:solidFill>
+              </a:rPr>
               <a:t>https://</a:t>
             </a:r>
             <a:r>
-              <a:rPr lang="en-GB" dirty="0" err="1"/>
-              <a:t>www.youtube.com</a:t>
-            </a:r>
-            <a:r>
-              <a:rPr lang="en-GB" dirty="0"/>
-              <a:t>/</a:t>
-            </a:r>
-            <a:r>
-              <a:rPr lang="en-GB" dirty="0" err="1"/>
-              <a:t>watch?v</a:t>
-            </a:r>
-            <a:r>
-              <a:rPr lang="en-GB" dirty="0"/>
-              <a:t>=</a:t>
-            </a:r>
-            <a:r>
-              <a:rPr lang="en-GB" dirty="0" err="1"/>
-              <a:t>gcQaEsfjBVo</a:t>
-            </a:r>
-            <a:endParaRPr lang="en-GB" dirty="0"/>
-          </a:p>
-          <a:p>
-            <a:endParaRPr lang="en-GB" dirty="0"/>
-          </a:p>
-          <a:p>
-            <a:r>
-              <a:rPr lang="en-US" dirty="0"/>
+              <a:rPr lang="en-GB" b="1" dirty="0" err="1">
+                <a:solidFill>
+                  <a:srgbClr val="00B0F0"/>
+                </a:solidFill>
+              </a:rPr>
+              <a:t>www.digitalocean.com</a:t>
+            </a:r>
+            <a:r>
+              <a:rPr lang="en-GB" b="1" dirty="0">
+                <a:solidFill>
+                  <a:srgbClr val="00B0F0"/>
+                </a:solidFill>
+              </a:rPr>
+              <a:t>/community/tutorials/angular-introduction-unit-testing</a:t>
+            </a:r>
+          </a:p>
+          <a:p>
+            <a:endParaRPr lang="en-GB" b="1" dirty="0">
+              <a:solidFill>
+                <a:srgbClr val="00B0F0"/>
+              </a:solidFill>
+            </a:endParaRPr>
+          </a:p>
+          <a:p>
+            <a:r>
+              <a:rPr lang="en-US" b="1" dirty="0">
+                <a:solidFill>
+                  <a:srgbClr val="00B0F0"/>
+                </a:solidFill>
+              </a:rPr>
               <a:t>https://</a:t>
             </a:r>
             <a:r>
-              <a:rPr lang="en-US" dirty="0" err="1"/>
+              <a:rPr lang="en-US" b="1" dirty="0" err="1">
+                <a:solidFill>
+                  <a:srgbClr val="00B0F0"/>
+                </a:solidFill>
+              </a:rPr>
               <a:t>blog.logrocket.com</a:t>
             </a:r>
             <a:r>
-              <a:rPr lang="en-US" dirty="0"/>
+              <a:rPr lang="en-US" b="1" dirty="0">
+                <a:solidFill>
+                  <a:srgbClr val="00B0F0"/>
+                </a:solidFill>
+              </a:rPr>
               <a:t>/angular-unit-testing-tutorial-examples/</a:t>
             </a:r>
-            <a:endParaRPr lang="en-NL" dirty="0"/>
+            <a:endParaRPr lang="en-NL" b="1" dirty="0">
+              <a:solidFill>
+                <a:srgbClr val="00B0F0"/>
+              </a:solidFill>
+            </a:endParaRPr>
           </a:p>
         </p:txBody>
       </p:sp>
@@ -2635,7 +3464,7 @@
 </p:sld>
 </file>
 
-<file path=ppt/slides/slide7.xml><?xml version="1.0" encoding="utf-8"?>
+<file path=ppt/slides/slide18.xml><?xml version="1.0" encoding="utf-8"?>
 <p:sld xmlns:a="http://schemas.openxmlformats.org/drawingml/2006/main" xmlns:r="http://schemas.openxmlformats.org/officeDocument/2006/relationships" xmlns:p="http://schemas.openxmlformats.org/presentationml/2006/main">
   <p:cSld>
     <p:spTree>
@@ -2657,6 +3486,173 @@
           <p:cNvPr id="2" name="Title 1">
             <a:extLst>
               <a:ext uri="{FF2B5EF4-FFF2-40B4-BE49-F238E27FC236}">
+                <a16:creationId xmlns:a16="http://schemas.microsoft.com/office/drawing/2014/main" id="{DB616C42-A7A9-AE44-823C-AB44FB9FE6F8}"/>
+              </a:ext>
+            </a:extLst>
+          </p:cNvPr>
+          <p:cNvSpPr>
+            <a:spLocks noGrp="1"/>
+          </p:cNvSpPr>
+          <p:nvPr>
+            <p:ph type="title"/>
+          </p:nvPr>
+        </p:nvSpPr>
+        <p:spPr>
+          <a:xfrm>
+            <a:off x="460615" y="483077"/>
+            <a:ext cx="9772169" cy="423193"/>
+          </a:xfrm>
+        </p:spPr>
+        <p:txBody>
+          <a:bodyPr/>
+          <a:lstStyle/>
+          <a:p>
+            <a:pPr algn="ctr"/>
+            <a:r>
+              <a:rPr lang="en-NL" dirty="0"/>
+              <a:t>G07- Unit testing</a:t>
+            </a:r>
+          </a:p>
+        </p:txBody>
+      </p:sp>
+      <p:sp>
+        <p:nvSpPr>
+          <p:cNvPr id="3" name="Text Placeholder 2">
+            <a:extLst>
+              <a:ext uri="{FF2B5EF4-FFF2-40B4-BE49-F238E27FC236}">
+                <a16:creationId xmlns:a16="http://schemas.microsoft.com/office/drawing/2014/main" id="{0970C9B2-0B8F-F147-A599-9E2DB25671AB}"/>
+              </a:ext>
+            </a:extLst>
+          </p:cNvPr>
+          <p:cNvSpPr>
+            <a:spLocks noGrp="1"/>
+          </p:cNvSpPr>
+          <p:nvPr>
+            <p:ph type="body" idx="1"/>
+          </p:nvPr>
+        </p:nvSpPr>
+        <p:spPr>
+          <a:xfrm>
+            <a:off x="1586617" y="2257425"/>
+            <a:ext cx="8895474" cy="4201150"/>
+          </a:xfrm>
+        </p:spPr>
+        <p:txBody>
+          <a:bodyPr/>
+          <a:lstStyle/>
+          <a:p>
+            <a:r>
+              <a:rPr lang="en-NL" b="1" u="sng" dirty="0"/>
+              <a:t>Frontend</a:t>
+            </a:r>
+            <a:r>
+              <a:rPr lang="en-NL" dirty="0"/>
+              <a:t>:</a:t>
+            </a:r>
+          </a:p>
+          <a:p>
+            <a:r>
+              <a:rPr lang="en-NL" dirty="0"/>
+              <a:t>npm install</a:t>
+            </a:r>
+          </a:p>
+          <a:p>
+            <a:r>
+              <a:rPr lang="en-GB" dirty="0"/>
+              <a:t>n</a:t>
+            </a:r>
+            <a:r>
+              <a:rPr lang="en-NL" dirty="0"/>
+              <a:t>pm start</a:t>
+            </a:r>
+          </a:p>
+          <a:p>
+            <a:endParaRPr lang="en-NL" dirty="0"/>
+          </a:p>
+          <a:p>
+            <a:endParaRPr lang="en-NL" dirty="0"/>
+          </a:p>
+          <a:p>
+            <a:r>
+              <a:rPr lang="en-NL" b="1" u="sng" dirty="0"/>
+              <a:t>Backend</a:t>
+            </a:r>
+            <a:endParaRPr lang="en-NL" dirty="0"/>
+          </a:p>
+          <a:p>
+            <a:r>
+              <a:rPr lang="en-GB" dirty="0"/>
+              <a:t>n</a:t>
+            </a:r>
+            <a:r>
+              <a:rPr lang="en-NL" dirty="0"/>
+              <a:t>pm run server</a:t>
+            </a:r>
+          </a:p>
+          <a:p>
+            <a:endParaRPr lang="en-NL" dirty="0"/>
+          </a:p>
+          <a:p>
+            <a:endParaRPr lang="en-NL" dirty="0"/>
+          </a:p>
+          <a:p>
+            <a:r>
+              <a:rPr lang="en-NL" b="1" u="sng" dirty="0"/>
+              <a:t>Start Karma tests:</a:t>
+            </a:r>
+          </a:p>
+          <a:p>
+            <a:r>
+              <a:rPr lang="en-GB" dirty="0"/>
+              <a:t>ng test</a:t>
+            </a:r>
+          </a:p>
+          <a:p>
+            <a:endParaRPr lang="en-GB" dirty="0"/>
+          </a:p>
+          <a:p>
+            <a:endParaRPr lang="en-GB" dirty="0"/>
+          </a:p>
+          <a:p>
+            <a:endParaRPr lang="en-NL" dirty="0"/>
+          </a:p>
+        </p:txBody>
+      </p:sp>
+    </p:spTree>
+    <p:extLst>
+      <p:ext uri="{BB962C8B-B14F-4D97-AF65-F5344CB8AC3E}">
+        <p14:creationId xmlns:p14="http://schemas.microsoft.com/office/powerpoint/2010/main" val="705454719"/>
+      </p:ext>
+    </p:extLst>
+  </p:cSld>
+  <p:clrMapOvr>
+    <a:masterClrMapping/>
+  </p:clrMapOvr>
+</p:sld>
+</file>
+
+<file path=ppt/slides/slide19.xml><?xml version="1.0" encoding="utf-8"?>
+<p:sld xmlns:a="http://schemas.openxmlformats.org/drawingml/2006/main" xmlns:r="http://schemas.openxmlformats.org/officeDocument/2006/relationships" xmlns:p="http://schemas.openxmlformats.org/presentationml/2006/main">
+  <p:cSld>
+    <p:spTree>
+      <p:nvGrpSpPr>
+        <p:cNvPr id="1" name=""/>
+        <p:cNvGrpSpPr/>
+        <p:nvPr/>
+      </p:nvGrpSpPr>
+      <p:grpSpPr>
+        <a:xfrm>
+          <a:off x="0" y="0"/>
+          <a:ext cx="0" cy="0"/>
+          <a:chOff x="0" y="0"/>
+          <a:chExt cx="0" cy="0"/>
+        </a:xfrm>
+      </p:grpSpPr>
+      <p:sp>
+        <p:nvSpPr>
+          <p:cNvPr id="2" name="Title 1">
+            <a:extLst>
+              <a:ext uri="{FF2B5EF4-FFF2-40B4-BE49-F238E27FC236}">
                 <a16:creationId xmlns:a16="http://schemas.microsoft.com/office/drawing/2014/main" id="{1D0C1E8E-7AC7-354B-98AF-85D71EA84431}"/>
               </a:ext>
             </a:extLst>
@@ -2723,7 +3719,126 @@
 </p:sld>
 </file>
 
-<file path=ppt/slides/slide8.xml><?xml version="1.0" encoding="utf-8"?>
+<file path=ppt/slides/slide2.xml><?xml version="1.0" encoding="utf-8"?>
+<p:sld xmlns:a="http://schemas.openxmlformats.org/drawingml/2006/main" xmlns:r="http://schemas.openxmlformats.org/officeDocument/2006/relationships" xmlns:p="http://schemas.openxmlformats.org/presentationml/2006/main">
+  <p:cSld>
+    <p:spTree>
+      <p:nvGrpSpPr>
+        <p:cNvPr id="1" name=""/>
+        <p:cNvGrpSpPr/>
+        <p:nvPr/>
+      </p:nvGrpSpPr>
+      <p:grpSpPr>
+        <a:xfrm>
+          <a:off x="0" y="0"/>
+          <a:ext cx="0" cy="0"/>
+          <a:chOff x="0" y="0"/>
+          <a:chExt cx="0" cy="0"/>
+        </a:xfrm>
+      </p:grpSpPr>
+      <p:sp>
+        <p:nvSpPr>
+          <p:cNvPr id="2" name="Title 1">
+            <a:extLst>
+              <a:ext uri="{FF2B5EF4-FFF2-40B4-BE49-F238E27FC236}">
+                <a16:creationId xmlns:a16="http://schemas.microsoft.com/office/drawing/2014/main" id="{98B2A19E-AD44-3146-A00D-AD079113564D}"/>
+              </a:ext>
+            </a:extLst>
+          </p:cNvPr>
+          <p:cNvSpPr>
+            <a:spLocks noGrp="1"/>
+          </p:cNvSpPr>
+          <p:nvPr>
+            <p:ph type="title"/>
+          </p:nvPr>
+        </p:nvSpPr>
+        <p:spPr>
+          <a:xfrm>
+            <a:off x="460615" y="483077"/>
+            <a:ext cx="9772169" cy="423193"/>
+          </a:xfrm>
+        </p:spPr>
+        <p:txBody>
+          <a:bodyPr/>
+          <a:lstStyle/>
+          <a:p>
+            <a:pPr algn="ctr"/>
+            <a:r>
+              <a:rPr lang="en-NL" dirty="0"/>
+              <a:t>2 types testing in Angular</a:t>
+            </a:r>
+          </a:p>
+        </p:txBody>
+      </p:sp>
+      <p:sp>
+        <p:nvSpPr>
+          <p:cNvPr id="3" name="Text Placeholder 2">
+            <a:extLst>
+              <a:ext uri="{FF2B5EF4-FFF2-40B4-BE49-F238E27FC236}">
+                <a16:creationId xmlns:a16="http://schemas.microsoft.com/office/drawing/2014/main" id="{AC315098-EEBA-2F4B-B153-00A4AB5D8BB4}"/>
+              </a:ext>
+            </a:extLst>
+          </p:cNvPr>
+          <p:cNvSpPr>
+            <a:spLocks noGrp="1"/>
+          </p:cNvSpPr>
+          <p:nvPr>
+            <p:ph type="body" idx="1"/>
+          </p:nvPr>
+        </p:nvSpPr>
+        <p:spPr>
+          <a:xfrm>
+            <a:off x="1586617" y="2257425"/>
+            <a:ext cx="8895474" cy="1200329"/>
+          </a:xfrm>
+        </p:spPr>
+        <p:txBody>
+          <a:bodyPr/>
+          <a:lstStyle/>
+          <a:p>
+            <a:r>
+              <a:rPr lang="en-US" b="1" dirty="0"/>
+              <a:t>Unit testing - </a:t>
+            </a:r>
+            <a:r>
+              <a:rPr lang="en-US" dirty="0"/>
+              <a:t>testing small, isolated pieces of code</a:t>
+            </a:r>
+            <a:endParaRPr lang="en-US" b="1" dirty="0"/>
+          </a:p>
+          <a:p>
+            <a:endParaRPr lang="en-US" b="1" dirty="0"/>
+          </a:p>
+          <a:p>
+            <a:endParaRPr lang="en-US" b="1" dirty="0"/>
+          </a:p>
+          <a:p>
+            <a:r>
+              <a:rPr lang="en-US" b="1" dirty="0"/>
+              <a:t>Functional testing</a:t>
+            </a:r>
+            <a:r>
+              <a:rPr lang="en-US" dirty="0"/>
+              <a:t> - e2e testing</a:t>
+            </a:r>
+            <a:endParaRPr lang="en-NL" dirty="0"/>
+          </a:p>
+        </p:txBody>
+      </p:sp>
+    </p:spTree>
+    <p:extLst>
+      <p:ext uri="{BB962C8B-B14F-4D97-AF65-F5344CB8AC3E}">
+        <p14:creationId xmlns:p14="http://schemas.microsoft.com/office/powerpoint/2010/main" val="1263883593"/>
+      </p:ext>
+    </p:extLst>
+  </p:cSld>
+  <p:clrMapOvr>
+    <a:masterClrMapping/>
+  </p:clrMapOvr>
+</p:sld>
+</file>
+
+<file path=ppt/slides/slide20.xml><?xml version="1.0" encoding="utf-8"?>
 <p:sld xmlns:a="http://schemas.openxmlformats.org/drawingml/2006/main" xmlns:r="http://schemas.openxmlformats.org/officeDocument/2006/relationships" xmlns:p="http://schemas.openxmlformats.org/presentationml/2006/main">
   <p:cSld>
     <p:spTree>
@@ -2823,6 +3938,1029 @@
 </p:sld>
 </file>
 
+<file path=ppt/slides/slide21.xml><?xml version="1.0" encoding="utf-8"?>
+<p:sld xmlns:a="http://schemas.openxmlformats.org/drawingml/2006/main" xmlns:r="http://schemas.openxmlformats.org/officeDocument/2006/relationships" xmlns:p="http://schemas.openxmlformats.org/presentationml/2006/main">
+  <p:cSld>
+    <p:spTree>
+      <p:nvGrpSpPr>
+        <p:cNvPr id="1" name=""/>
+        <p:cNvGrpSpPr/>
+        <p:nvPr/>
+      </p:nvGrpSpPr>
+      <p:grpSpPr>
+        <a:xfrm>
+          <a:off x="0" y="0"/>
+          <a:ext cx="0" cy="0"/>
+          <a:chOff x="0" y="0"/>
+          <a:chExt cx="0" cy="0"/>
+        </a:xfrm>
+      </p:grpSpPr>
+      <p:sp>
+        <p:nvSpPr>
+          <p:cNvPr id="2" name="Title 1">
+            <a:extLst>
+              <a:ext uri="{FF2B5EF4-FFF2-40B4-BE49-F238E27FC236}">
+                <a16:creationId xmlns:a16="http://schemas.microsoft.com/office/drawing/2014/main" id="{5BB0E7F4-0321-014B-A63A-F23F14AEE68B}"/>
+              </a:ext>
+            </a:extLst>
+          </p:cNvPr>
+          <p:cNvSpPr>
+            <a:spLocks noGrp="1"/>
+          </p:cNvSpPr>
+          <p:nvPr>
+            <p:ph type="title"/>
+          </p:nvPr>
+        </p:nvSpPr>
+        <p:spPr>
+          <a:xfrm>
+            <a:off x="660005" y="447302"/>
+            <a:ext cx="9772169" cy="423193"/>
+          </a:xfrm>
+        </p:spPr>
+        <p:txBody>
+          <a:bodyPr/>
+          <a:lstStyle/>
+          <a:p>
+            <a:pPr algn="ctr"/>
+            <a:r>
+              <a:rPr lang="en-NL" dirty="0"/>
+              <a:t>Cypress e2e testing</a:t>
+            </a:r>
+          </a:p>
+        </p:txBody>
+      </p:sp>
+      <p:sp>
+        <p:nvSpPr>
+          <p:cNvPr id="3" name="Text Placeholder 2">
+            <a:extLst>
+              <a:ext uri="{FF2B5EF4-FFF2-40B4-BE49-F238E27FC236}">
+                <a16:creationId xmlns:a16="http://schemas.microsoft.com/office/drawing/2014/main" id="{BF32D94C-464B-714A-88EB-A78966994488}"/>
+              </a:ext>
+            </a:extLst>
+          </p:cNvPr>
+          <p:cNvSpPr>
+            <a:spLocks noGrp="1"/>
+          </p:cNvSpPr>
+          <p:nvPr>
+            <p:ph type="body" idx="1"/>
+          </p:nvPr>
+        </p:nvSpPr>
+        <p:spPr>
+          <a:xfrm>
+            <a:off x="1536700" y="2028825"/>
+            <a:ext cx="8895474" cy="5101397"/>
+          </a:xfrm>
+        </p:spPr>
+        <p:txBody>
+          <a:bodyPr/>
+          <a:lstStyle/>
+          <a:p>
+            <a:pPr algn="ctr"/>
+            <a:r>
+              <a:rPr lang="en-US" b="1" i="1" dirty="0"/>
+              <a:t>Running Cypress</a:t>
+            </a:r>
+            <a:br>
+              <a:rPr lang="en-US" b="1" i="1" dirty="0"/>
+            </a:br>
+            <a:br>
+              <a:rPr lang="en-US" b="1" i="1" dirty="0"/>
+            </a:br>
+            <a:r>
+              <a:rPr lang="en-US" dirty="0"/>
+              <a:t>Start Cypress via: </a:t>
+            </a:r>
+            <a:r>
+              <a:rPr lang="en-US" b="1" i="1" dirty="0" err="1"/>
+              <a:t>npm</a:t>
+            </a:r>
+            <a:r>
+              <a:rPr lang="en-US" b="1" i="1" dirty="0"/>
+              <a:t> run </a:t>
+            </a:r>
+            <a:r>
+              <a:rPr lang="en-US" b="1" i="1" dirty="0" err="1"/>
+              <a:t>cypress:open</a:t>
+            </a:r>
+            <a:br>
+              <a:rPr lang="en-US" i="1" dirty="0"/>
+            </a:br>
+            <a:endParaRPr lang="en-US" i="1" dirty="0"/>
+          </a:p>
+          <a:p>
+            <a:pPr algn="ctr"/>
+            <a:endParaRPr lang="en-US" i="1" dirty="0"/>
+          </a:p>
+          <a:p>
+            <a:pPr algn="ctr"/>
+            <a:r>
+              <a:rPr lang="en-US" b="1" i="1" dirty="0"/>
+              <a:t>Running tests</a:t>
+            </a:r>
+            <a:br>
+              <a:rPr lang="en-US" b="1" i="1" dirty="0"/>
+            </a:br>
+            <a:br>
+              <a:rPr lang="en-US" b="1" i="1" dirty="0"/>
+            </a:br>
+            <a:r>
+              <a:rPr lang="en-US" dirty="0"/>
+              <a:t>Click on the </a:t>
+            </a:r>
+            <a:r>
+              <a:rPr lang="en-US" i="1" dirty="0"/>
+              <a:t>`</a:t>
+            </a:r>
+            <a:r>
+              <a:rPr lang="en-US" i="1" dirty="0">
+                <a:solidFill>
+                  <a:srgbClr val="C00000"/>
+                </a:solidFill>
+              </a:rPr>
+              <a:t>feature</a:t>
+            </a:r>
+            <a:r>
+              <a:rPr lang="en-US" i="1" dirty="0"/>
+              <a:t>`</a:t>
+            </a:r>
+            <a:r>
+              <a:rPr lang="en-US" dirty="0"/>
+              <a:t>-file you want to test</a:t>
+            </a:r>
+            <a:br>
+              <a:rPr lang="en-US" dirty="0"/>
+            </a:br>
+            <a:endParaRPr lang="en-US" dirty="0"/>
+          </a:p>
+          <a:p>
+            <a:pPr algn="ctr"/>
+            <a:endParaRPr lang="en-US" dirty="0"/>
+          </a:p>
+          <a:p>
+            <a:endParaRPr lang="en-US" dirty="0"/>
+          </a:p>
+          <a:p>
+            <a:pPr algn="ctr"/>
+            <a:r>
+              <a:rPr lang="en-US" b="1" i="1" dirty="0"/>
+              <a:t>Best practices</a:t>
+            </a:r>
+            <a:br>
+              <a:rPr lang="en-US" b="1" i="1" dirty="0"/>
+            </a:br>
+            <a:br>
+              <a:rPr lang="en-US" b="1" i="1" dirty="0"/>
+            </a:br>
+            <a:r>
+              <a:rPr lang="en-US" dirty="0"/>
+              <a:t>Follow this site to set up the tests: </a:t>
+            </a:r>
+          </a:p>
+          <a:p>
+            <a:pPr algn="ctr"/>
+            <a:endParaRPr lang="en-US" i="1" dirty="0"/>
+          </a:p>
+          <a:p>
+            <a:pPr algn="ctr"/>
+            <a:r>
+              <a:rPr lang="en-US" b="1" i="1" dirty="0">
+                <a:solidFill>
+                  <a:srgbClr val="00B0F0"/>
+                </a:solidFill>
+              </a:rPr>
+              <a:t>https://</a:t>
+            </a:r>
+            <a:r>
+              <a:rPr lang="en-US" b="1" i="1" dirty="0" err="1">
+                <a:solidFill>
+                  <a:srgbClr val="00B0F0"/>
+                </a:solidFill>
+              </a:rPr>
+              <a:t>docs.cypress.io</a:t>
+            </a:r>
+            <a:r>
+              <a:rPr lang="en-US" b="1" i="1" dirty="0">
+                <a:solidFill>
+                  <a:srgbClr val="00B0F0"/>
+                </a:solidFill>
+              </a:rPr>
+              <a:t>/guides/references/best-practices</a:t>
+            </a:r>
+            <a:br>
+              <a:rPr lang="en-US" i="1" dirty="0"/>
+            </a:br>
+            <a:endParaRPr lang="en-NL" dirty="0"/>
+          </a:p>
+        </p:txBody>
+      </p:sp>
+    </p:spTree>
+    <p:extLst>
+      <p:ext uri="{BB962C8B-B14F-4D97-AF65-F5344CB8AC3E}">
+        <p14:creationId xmlns:p14="http://schemas.microsoft.com/office/powerpoint/2010/main" val="2694191809"/>
+      </p:ext>
+    </p:extLst>
+  </p:cSld>
+  <p:clrMapOvr>
+    <a:masterClrMapping/>
+  </p:clrMapOvr>
+</p:sld>
+</file>
+
+<file path=ppt/slides/slide3.xml><?xml version="1.0" encoding="utf-8"?>
+<p:sld xmlns:a="http://schemas.openxmlformats.org/drawingml/2006/main" xmlns:r="http://schemas.openxmlformats.org/officeDocument/2006/relationships" xmlns:p="http://schemas.openxmlformats.org/presentationml/2006/main">
+  <p:cSld>
+    <p:spTree>
+      <p:nvGrpSpPr>
+        <p:cNvPr id="1" name=""/>
+        <p:cNvGrpSpPr/>
+        <p:nvPr/>
+      </p:nvGrpSpPr>
+      <p:grpSpPr>
+        <a:xfrm>
+          <a:off x="0" y="0"/>
+          <a:ext cx="0" cy="0"/>
+          <a:chOff x="0" y="0"/>
+          <a:chExt cx="0" cy="0"/>
+        </a:xfrm>
+      </p:grpSpPr>
+      <p:sp>
+        <p:nvSpPr>
+          <p:cNvPr id="2" name="Title 1">
+            <a:extLst>
+              <a:ext uri="{FF2B5EF4-FFF2-40B4-BE49-F238E27FC236}">
+                <a16:creationId xmlns:a16="http://schemas.microsoft.com/office/drawing/2014/main" id="{BBBE3C0D-AD42-C445-8742-382A78B33F03}"/>
+              </a:ext>
+            </a:extLst>
+          </p:cNvPr>
+          <p:cNvSpPr>
+            <a:spLocks noGrp="1"/>
+          </p:cNvSpPr>
+          <p:nvPr>
+            <p:ph type="title"/>
+          </p:nvPr>
+        </p:nvSpPr>
+        <p:spPr/>
+        <p:txBody>
+          <a:bodyPr/>
+          <a:lstStyle/>
+          <a:p>
+            <a:endParaRPr lang="en-NL"/>
+          </a:p>
+        </p:txBody>
+      </p:sp>
+      <p:sp>
+        <p:nvSpPr>
+          <p:cNvPr id="3" name="Text Placeholder 2">
+            <a:extLst>
+              <a:ext uri="{FF2B5EF4-FFF2-40B4-BE49-F238E27FC236}">
+                <a16:creationId xmlns:a16="http://schemas.microsoft.com/office/drawing/2014/main" id="{9FBDEB5D-A1A1-1348-9637-3E7767B65114}"/>
+              </a:ext>
+            </a:extLst>
+          </p:cNvPr>
+          <p:cNvSpPr>
+            <a:spLocks noGrp="1"/>
+          </p:cNvSpPr>
+          <p:nvPr>
+            <p:ph type="body" idx="1"/>
+          </p:nvPr>
+        </p:nvSpPr>
+        <p:spPr>
+          <a:xfrm>
+            <a:off x="1586617" y="2257425"/>
+            <a:ext cx="8895474" cy="615553"/>
+          </a:xfrm>
+        </p:spPr>
+        <p:txBody>
+          <a:bodyPr/>
+          <a:lstStyle/>
+          <a:p>
+            <a:pPr algn="ctr"/>
+            <a:r>
+              <a:rPr lang="en-NL" sz="4000" b="1" dirty="0"/>
+              <a:t>Unit testing</a:t>
+            </a:r>
+          </a:p>
+        </p:txBody>
+      </p:sp>
+    </p:spTree>
+    <p:extLst>
+      <p:ext uri="{BB962C8B-B14F-4D97-AF65-F5344CB8AC3E}">
+        <p14:creationId xmlns:p14="http://schemas.microsoft.com/office/powerpoint/2010/main" val="2961612919"/>
+      </p:ext>
+    </p:extLst>
+  </p:cSld>
+  <p:clrMapOvr>
+    <a:masterClrMapping/>
+  </p:clrMapOvr>
+</p:sld>
+</file>
+
+<file path=ppt/slides/slide4.xml><?xml version="1.0" encoding="utf-8"?>
+<p:sld xmlns:a="http://schemas.openxmlformats.org/drawingml/2006/main" xmlns:r="http://schemas.openxmlformats.org/officeDocument/2006/relationships" xmlns:p="http://schemas.openxmlformats.org/presentationml/2006/main">
+  <p:cSld>
+    <p:spTree>
+      <p:nvGrpSpPr>
+        <p:cNvPr id="1" name=""/>
+        <p:cNvGrpSpPr/>
+        <p:nvPr/>
+      </p:nvGrpSpPr>
+      <p:grpSpPr>
+        <a:xfrm>
+          <a:off x="0" y="0"/>
+          <a:ext cx="0" cy="0"/>
+          <a:chOff x="0" y="0"/>
+          <a:chExt cx="0" cy="0"/>
+        </a:xfrm>
+      </p:grpSpPr>
+      <p:sp>
+        <p:nvSpPr>
+          <p:cNvPr id="2" name="Title 1">
+            <a:extLst>
+              <a:ext uri="{FF2B5EF4-FFF2-40B4-BE49-F238E27FC236}">
+                <a16:creationId xmlns:a16="http://schemas.microsoft.com/office/drawing/2014/main" id="{F71069B1-80D7-B246-A3DD-1B48C01749D0}"/>
+              </a:ext>
+            </a:extLst>
+          </p:cNvPr>
+          <p:cNvSpPr>
+            <a:spLocks noGrp="1"/>
+          </p:cNvSpPr>
+          <p:nvPr>
+            <p:ph type="title"/>
+          </p:nvPr>
+        </p:nvSpPr>
+        <p:spPr/>
+        <p:txBody>
+          <a:bodyPr/>
+          <a:lstStyle/>
+          <a:p>
+            <a:endParaRPr lang="en-NL" dirty="0"/>
+          </a:p>
+        </p:txBody>
+      </p:sp>
+      <p:sp>
+        <p:nvSpPr>
+          <p:cNvPr id="3" name="Text Placeholder 2">
+            <a:extLst>
+              <a:ext uri="{FF2B5EF4-FFF2-40B4-BE49-F238E27FC236}">
+                <a16:creationId xmlns:a16="http://schemas.microsoft.com/office/drawing/2014/main" id="{540EB38B-95DF-6D46-B93E-1994C079981B}"/>
+              </a:ext>
+            </a:extLst>
+          </p:cNvPr>
+          <p:cNvSpPr>
+            <a:spLocks noGrp="1"/>
+          </p:cNvSpPr>
+          <p:nvPr>
+            <p:ph type="body" idx="1"/>
+          </p:nvPr>
+        </p:nvSpPr>
+        <p:spPr>
+          <a:xfrm>
+            <a:off x="1586617" y="2257425"/>
+            <a:ext cx="8895474" cy="2400657"/>
+          </a:xfrm>
+        </p:spPr>
+        <p:txBody>
+          <a:bodyPr/>
+          <a:lstStyle/>
+          <a:p>
+            <a:r>
+              <a:rPr lang="en-NL" dirty="0"/>
+              <a:t>Place your tests in a </a:t>
+            </a:r>
+            <a:r>
+              <a:rPr lang="en-NL" b="1" i="1" dirty="0"/>
+              <a:t>.spec.ts </a:t>
+            </a:r>
+            <a:r>
+              <a:rPr lang="en-NL" dirty="0"/>
+              <a:t>file</a:t>
+            </a:r>
+          </a:p>
+          <a:p>
+            <a:endParaRPr lang="en-NL" dirty="0"/>
+          </a:p>
+          <a:p>
+            <a:r>
+              <a:rPr lang="en-US" dirty="0"/>
+              <a:t>Put unit test </a:t>
+            </a:r>
+            <a:r>
+              <a:rPr lang="en-US" i="1" dirty="0"/>
+              <a:t>spec files </a:t>
+            </a:r>
+            <a:r>
+              <a:rPr lang="en-US" dirty="0"/>
+              <a:t>in the same folder as the application source code files that you test</a:t>
+            </a:r>
+          </a:p>
+          <a:p>
+            <a:endParaRPr lang="en-US" dirty="0"/>
+          </a:p>
+          <a:p>
+            <a:r>
+              <a:rPr lang="en-US" dirty="0"/>
+              <a:t>Test your overall test coverage with:</a:t>
+            </a:r>
+          </a:p>
+          <a:p>
+            <a:endParaRPr lang="en-US" dirty="0"/>
+          </a:p>
+          <a:p>
+            <a:pPr algn="ctr"/>
+            <a:r>
+              <a:rPr lang="en-US" b="1" i="1" dirty="0"/>
+              <a:t>ng test --no-watch --code-coverage</a:t>
+            </a:r>
+            <a:endParaRPr lang="en-NL" b="1" dirty="0"/>
+          </a:p>
+        </p:txBody>
+      </p:sp>
+    </p:spTree>
+    <p:extLst>
+      <p:ext uri="{BB962C8B-B14F-4D97-AF65-F5344CB8AC3E}">
+        <p14:creationId xmlns:p14="http://schemas.microsoft.com/office/powerpoint/2010/main" val="3257701990"/>
+      </p:ext>
+    </p:extLst>
+  </p:cSld>
+  <p:clrMapOvr>
+    <a:masterClrMapping/>
+  </p:clrMapOvr>
+</p:sld>
+</file>
+
+<file path=ppt/slides/slide5.xml><?xml version="1.0" encoding="utf-8"?>
+<p:sld xmlns:a="http://schemas.openxmlformats.org/drawingml/2006/main" xmlns:r="http://schemas.openxmlformats.org/officeDocument/2006/relationships" xmlns:p="http://schemas.openxmlformats.org/presentationml/2006/main">
+  <p:cSld>
+    <p:spTree>
+      <p:nvGrpSpPr>
+        <p:cNvPr id="1" name=""/>
+        <p:cNvGrpSpPr/>
+        <p:nvPr/>
+      </p:nvGrpSpPr>
+      <p:grpSpPr>
+        <a:xfrm>
+          <a:off x="0" y="0"/>
+          <a:ext cx="0" cy="0"/>
+          <a:chOff x="0" y="0"/>
+          <a:chExt cx="0" cy="0"/>
+        </a:xfrm>
+      </p:grpSpPr>
+      <p:sp>
+        <p:nvSpPr>
+          <p:cNvPr id="2" name="Title 1">
+            <a:extLst>
+              <a:ext uri="{FF2B5EF4-FFF2-40B4-BE49-F238E27FC236}">
+                <a16:creationId xmlns:a16="http://schemas.microsoft.com/office/drawing/2014/main" id="{4017007B-CD2B-B241-AB7A-3F75F0A7FEA6}"/>
+              </a:ext>
+            </a:extLst>
+          </p:cNvPr>
+          <p:cNvSpPr>
+            <a:spLocks noGrp="1"/>
+          </p:cNvSpPr>
+          <p:nvPr>
+            <p:ph type="title"/>
+          </p:nvPr>
+        </p:nvSpPr>
+        <p:spPr>
+          <a:xfrm>
+            <a:off x="460615" y="483077"/>
+            <a:ext cx="9772169" cy="423193"/>
+          </a:xfrm>
+        </p:spPr>
+        <p:txBody>
+          <a:bodyPr/>
+          <a:lstStyle/>
+          <a:p>
+            <a:pPr algn="ctr"/>
+            <a:r>
+              <a:rPr lang="en-NL" dirty="0"/>
+              <a:t>Jasmine</a:t>
+            </a:r>
+          </a:p>
+        </p:txBody>
+      </p:sp>
+      <p:sp>
+        <p:nvSpPr>
+          <p:cNvPr id="3" name="Text Placeholder 2">
+            <a:extLst>
+              <a:ext uri="{FF2B5EF4-FFF2-40B4-BE49-F238E27FC236}">
+                <a16:creationId xmlns:a16="http://schemas.microsoft.com/office/drawing/2014/main" id="{05F9B028-7FD4-A946-97F3-047882A7EECB}"/>
+              </a:ext>
+            </a:extLst>
+          </p:cNvPr>
+          <p:cNvSpPr>
+            <a:spLocks noGrp="1"/>
+          </p:cNvSpPr>
+          <p:nvPr>
+            <p:ph type="body" idx="1"/>
+          </p:nvPr>
+        </p:nvSpPr>
+        <p:spPr>
+          <a:xfrm>
+            <a:off x="1586617" y="2257425"/>
+            <a:ext cx="8895474" cy="3000821"/>
+          </a:xfrm>
+        </p:spPr>
+        <p:txBody>
+          <a:bodyPr/>
+          <a:lstStyle/>
+          <a:p>
+            <a:r>
+              <a:rPr lang="en-GB" b="1" dirty="0"/>
+              <a:t>Jasmine-core</a:t>
+            </a:r>
+            <a:r>
+              <a:rPr lang="en-GB" dirty="0"/>
+              <a:t> is the framework we are going to use to create our tests. </a:t>
+            </a:r>
+          </a:p>
+          <a:p>
+            <a:endParaRPr lang="en-GB" dirty="0"/>
+          </a:p>
+          <a:p>
+            <a:r>
+              <a:rPr lang="en-GB" b="1" dirty="0"/>
+              <a:t>Jasmine</a:t>
+            </a:r>
+            <a:r>
+              <a:rPr lang="en-GB" dirty="0"/>
+              <a:t> is a </a:t>
+            </a:r>
+            <a:r>
+              <a:rPr lang="en-GB" i="1" dirty="0"/>
+              <a:t>behaviour-driven development framework for testing.</a:t>
+            </a:r>
+          </a:p>
+          <a:p>
+            <a:endParaRPr lang="en-GB" i="1" dirty="0"/>
+          </a:p>
+          <a:p>
+            <a:r>
+              <a:rPr lang="en-GB" b="1" dirty="0"/>
+              <a:t>Jasmine</a:t>
+            </a:r>
+            <a:r>
+              <a:rPr lang="en-GB" dirty="0"/>
+              <a:t> also provides mocking.</a:t>
+            </a:r>
+            <a:endParaRPr lang="en-GB" i="1" dirty="0"/>
+          </a:p>
+          <a:p>
+            <a:endParaRPr lang="en-GB" i="1" dirty="0"/>
+          </a:p>
+          <a:p>
+            <a:endParaRPr lang="en-GB" i="1" dirty="0"/>
+          </a:p>
+          <a:p>
+            <a:endParaRPr lang="en-GB" b="1" dirty="0"/>
+          </a:p>
+          <a:p>
+            <a:endParaRPr lang="en-GB" dirty="0"/>
+          </a:p>
+        </p:txBody>
+      </p:sp>
+      <p:pic>
+        <p:nvPicPr>
+          <p:cNvPr id="4" name="Picture 3">
+            <a:extLst>
+              <a:ext uri="{FF2B5EF4-FFF2-40B4-BE49-F238E27FC236}">
+                <a16:creationId xmlns:a16="http://schemas.microsoft.com/office/drawing/2014/main" id="{AEB5BE40-FFB0-7046-A494-C3B47042C806}"/>
+              </a:ext>
+            </a:extLst>
+          </p:cNvPr>
+          <p:cNvPicPr>
+            <a:picLocks noChangeAspect="1"/>
+          </p:cNvPicPr>
+          <p:nvPr/>
+        </p:nvPicPr>
+        <p:blipFill>
+          <a:blip r:embed="rId3"/>
+          <a:stretch>
+            <a:fillRect/>
+          </a:stretch>
+        </p:blipFill>
+        <p:spPr>
+          <a:xfrm>
+            <a:off x="2832100" y="4387090"/>
+            <a:ext cx="5207000" cy="1584416"/>
+          </a:xfrm>
+          <a:prstGeom prst="rect">
+            <a:avLst/>
+          </a:prstGeom>
+        </p:spPr>
+      </p:pic>
+    </p:spTree>
+    <p:extLst>
+      <p:ext uri="{BB962C8B-B14F-4D97-AF65-F5344CB8AC3E}">
+        <p14:creationId xmlns:p14="http://schemas.microsoft.com/office/powerpoint/2010/main" val="1961420514"/>
+      </p:ext>
+    </p:extLst>
+  </p:cSld>
+  <p:clrMapOvr>
+    <a:masterClrMapping/>
+  </p:clrMapOvr>
+</p:sld>
+</file>
+
+<file path=ppt/slides/slide6.xml><?xml version="1.0" encoding="utf-8"?>
+<p:sld xmlns:a="http://schemas.openxmlformats.org/drawingml/2006/main" xmlns:r="http://schemas.openxmlformats.org/officeDocument/2006/relationships" xmlns:p="http://schemas.openxmlformats.org/presentationml/2006/main">
+  <p:cSld>
+    <p:spTree>
+      <p:nvGrpSpPr>
+        <p:cNvPr id="1" name=""/>
+        <p:cNvGrpSpPr/>
+        <p:nvPr/>
+      </p:nvGrpSpPr>
+      <p:grpSpPr>
+        <a:xfrm>
+          <a:off x="0" y="0"/>
+          <a:ext cx="0" cy="0"/>
+          <a:chOff x="0" y="0"/>
+          <a:chExt cx="0" cy="0"/>
+        </a:xfrm>
+      </p:grpSpPr>
+      <p:sp>
+        <p:nvSpPr>
+          <p:cNvPr id="2" name="Title 1">
+            <a:extLst>
+              <a:ext uri="{FF2B5EF4-FFF2-40B4-BE49-F238E27FC236}">
+                <a16:creationId xmlns:a16="http://schemas.microsoft.com/office/drawing/2014/main" id="{EF550177-1AD9-3242-84B6-03DA878A27E1}"/>
+              </a:ext>
+            </a:extLst>
+          </p:cNvPr>
+          <p:cNvSpPr>
+            <a:spLocks noGrp="1"/>
+          </p:cNvSpPr>
+          <p:nvPr>
+            <p:ph type="title"/>
+          </p:nvPr>
+        </p:nvSpPr>
+        <p:spPr>
+          <a:xfrm>
+            <a:off x="460615" y="483077"/>
+            <a:ext cx="9772169" cy="423193"/>
+          </a:xfrm>
+        </p:spPr>
+        <p:txBody>
+          <a:bodyPr/>
+          <a:lstStyle/>
+          <a:p>
+            <a:pPr algn="ctr"/>
+            <a:r>
+              <a:rPr lang="en-NL" dirty="0"/>
+              <a:t>Karma</a:t>
+            </a:r>
+          </a:p>
+        </p:txBody>
+      </p:sp>
+      <p:sp>
+        <p:nvSpPr>
+          <p:cNvPr id="3" name="Text Placeholder 2">
+            <a:extLst>
+              <a:ext uri="{FF2B5EF4-FFF2-40B4-BE49-F238E27FC236}">
+                <a16:creationId xmlns:a16="http://schemas.microsoft.com/office/drawing/2014/main" id="{62216F5A-A903-5240-B61A-936BFCD0D5E3}"/>
+              </a:ext>
+            </a:extLst>
+          </p:cNvPr>
+          <p:cNvSpPr>
+            <a:spLocks noGrp="1"/>
+          </p:cNvSpPr>
+          <p:nvPr>
+            <p:ph type="body" idx="1"/>
+          </p:nvPr>
+        </p:nvSpPr>
+        <p:spPr>
+          <a:xfrm>
+            <a:off x="1586617" y="2257425"/>
+            <a:ext cx="8895474" cy="1800493"/>
+          </a:xfrm>
+        </p:spPr>
+        <p:txBody>
+          <a:bodyPr/>
+          <a:lstStyle/>
+          <a:p>
+            <a:r>
+              <a:rPr lang="en-GB" b="1" dirty="0"/>
+              <a:t>Karma</a:t>
+            </a:r>
+            <a:r>
+              <a:rPr lang="en-GB" dirty="0"/>
+              <a:t> is a </a:t>
+            </a:r>
+            <a:r>
+              <a:rPr lang="en-GB" u="sng" dirty="0"/>
+              <a:t>test runner</a:t>
+            </a:r>
+            <a:r>
+              <a:rPr lang="en-GB" dirty="0"/>
+              <a:t>. It uses a configuration file in order to set the </a:t>
+            </a:r>
+            <a:r>
+              <a:rPr lang="en-GB" dirty="0" err="1"/>
+              <a:t>startup</a:t>
+            </a:r>
+            <a:r>
+              <a:rPr lang="en-GB" dirty="0"/>
+              <a:t> file, the reporters, the testing framework, the browser among other things.</a:t>
+            </a:r>
+          </a:p>
+          <a:p>
+            <a:endParaRPr lang="en-GB" dirty="0"/>
+          </a:p>
+          <a:p>
+            <a:r>
+              <a:rPr lang="en-GB" b="1" dirty="0"/>
+              <a:t>Karma</a:t>
+            </a:r>
+            <a:r>
+              <a:rPr lang="en-GB" dirty="0"/>
+              <a:t> opens up the browser in order to run the tests.</a:t>
+            </a:r>
+          </a:p>
+          <a:p>
+            <a:endParaRPr lang="en-NL" dirty="0"/>
+          </a:p>
+        </p:txBody>
+      </p:sp>
+    </p:spTree>
+    <p:extLst>
+      <p:ext uri="{BB962C8B-B14F-4D97-AF65-F5344CB8AC3E}">
+        <p14:creationId xmlns:p14="http://schemas.microsoft.com/office/powerpoint/2010/main" val="945828404"/>
+      </p:ext>
+    </p:extLst>
+  </p:cSld>
+  <p:clrMapOvr>
+    <a:masterClrMapping/>
+  </p:clrMapOvr>
+</p:sld>
+</file>
+
+<file path=ppt/slides/slide7.xml><?xml version="1.0" encoding="utf-8"?>
+<p:sld xmlns:a="http://schemas.openxmlformats.org/drawingml/2006/main" xmlns:r="http://schemas.openxmlformats.org/officeDocument/2006/relationships" xmlns:p="http://schemas.openxmlformats.org/presentationml/2006/main">
+  <p:cSld>
+    <p:spTree>
+      <p:nvGrpSpPr>
+        <p:cNvPr id="1" name=""/>
+        <p:cNvGrpSpPr/>
+        <p:nvPr/>
+      </p:nvGrpSpPr>
+      <p:grpSpPr>
+        <a:xfrm>
+          <a:off x="0" y="0"/>
+          <a:ext cx="0" cy="0"/>
+          <a:chOff x="0" y="0"/>
+          <a:chExt cx="0" cy="0"/>
+        </a:xfrm>
+      </p:grpSpPr>
+      <p:sp>
+        <p:nvSpPr>
+          <p:cNvPr id="2" name="Title 1">
+            <a:extLst>
+              <a:ext uri="{FF2B5EF4-FFF2-40B4-BE49-F238E27FC236}">
+                <a16:creationId xmlns:a16="http://schemas.microsoft.com/office/drawing/2014/main" id="{733B869E-BA8D-384C-AD64-22C7FEE7FF95}"/>
+              </a:ext>
+            </a:extLst>
+          </p:cNvPr>
+          <p:cNvSpPr>
+            <a:spLocks noGrp="1"/>
+          </p:cNvSpPr>
+          <p:nvPr>
+            <p:ph type="title"/>
+          </p:nvPr>
+        </p:nvSpPr>
+        <p:spPr>
+          <a:xfrm>
+            <a:off x="460615" y="483077"/>
+            <a:ext cx="9772169" cy="423193"/>
+          </a:xfrm>
+        </p:spPr>
+        <p:txBody>
+          <a:bodyPr/>
+          <a:lstStyle/>
+          <a:p>
+            <a:pPr algn="ctr"/>
+            <a:r>
+              <a:rPr lang="en-NL" dirty="0"/>
+              <a:t>Testbed and async ?</a:t>
+            </a:r>
+          </a:p>
+        </p:txBody>
+      </p:sp>
+      <p:sp>
+        <p:nvSpPr>
+          <p:cNvPr id="3" name="Text Placeholder 2">
+            <a:extLst>
+              <a:ext uri="{FF2B5EF4-FFF2-40B4-BE49-F238E27FC236}">
+                <a16:creationId xmlns:a16="http://schemas.microsoft.com/office/drawing/2014/main" id="{6BEA4B58-9DF5-9944-AC74-D17E5E8BDB9F}"/>
+              </a:ext>
+            </a:extLst>
+          </p:cNvPr>
+          <p:cNvSpPr>
+            <a:spLocks noGrp="1"/>
+          </p:cNvSpPr>
+          <p:nvPr>
+            <p:ph type="body" idx="1"/>
+          </p:nvPr>
+        </p:nvSpPr>
+        <p:spPr>
+          <a:xfrm>
+            <a:off x="1586617" y="2257425"/>
+            <a:ext cx="8895474" cy="2700739"/>
+          </a:xfrm>
+        </p:spPr>
+        <p:txBody>
+          <a:bodyPr/>
+          <a:lstStyle/>
+          <a:p>
+            <a:r>
+              <a:rPr lang="en-US" dirty="0" err="1"/>
+              <a:t>TestBed</a:t>
+            </a:r>
+            <a:r>
+              <a:rPr lang="en-US" dirty="0"/>
+              <a:t> is </a:t>
+            </a:r>
+            <a:r>
+              <a:rPr lang="en-US" b="1" dirty="0"/>
+              <a:t>a mock environment to run Angular2 component tests without the</a:t>
+            </a:r>
+            <a:r>
+              <a:rPr lang="en-US" dirty="0"/>
+              <a:t> browser.</a:t>
+            </a:r>
+          </a:p>
+          <a:p>
+            <a:endParaRPr lang="en-US" dirty="0"/>
+          </a:p>
+          <a:p>
+            <a:endParaRPr lang="en-US" dirty="0"/>
+          </a:p>
+          <a:p>
+            <a:r>
+              <a:rPr lang="en-US" dirty="0" err="1"/>
+              <a:t>TestBed</a:t>
+            </a:r>
+            <a:r>
+              <a:rPr lang="en-US" dirty="0"/>
+              <a:t> and </a:t>
+            </a:r>
+            <a:r>
+              <a:rPr lang="en-US" b="1" i="1" dirty="0"/>
+              <a:t>async</a:t>
+            </a:r>
+            <a:r>
+              <a:rPr lang="en-US" dirty="0"/>
+              <a:t> makes testing </a:t>
+            </a:r>
+            <a:r>
+              <a:rPr lang="en-US" i="1" dirty="0">
+                <a:solidFill>
+                  <a:srgbClr val="C00000"/>
+                </a:solidFill>
+              </a:rPr>
+              <a:t>asynchronous</a:t>
+            </a:r>
+            <a:r>
+              <a:rPr lang="en-US" dirty="0"/>
+              <a:t> code, components, directives, or services easier.</a:t>
+            </a:r>
+          </a:p>
+          <a:p>
+            <a:endParaRPr lang="en-US" dirty="0"/>
+          </a:p>
+          <a:p>
+            <a:r>
+              <a:rPr lang="en-US" dirty="0"/>
+              <a:t>Testbed makes use of </a:t>
+            </a:r>
+            <a:r>
+              <a:rPr lang="en-US" i="1" dirty="0"/>
+              <a:t>Jasmine</a:t>
+            </a:r>
+            <a:r>
+              <a:rPr lang="en-US" dirty="0"/>
+              <a:t> test framework</a:t>
+            </a:r>
+          </a:p>
+          <a:p>
+            <a:endParaRPr lang="en-NL" dirty="0"/>
+          </a:p>
+        </p:txBody>
+      </p:sp>
+    </p:spTree>
+    <p:extLst>
+      <p:ext uri="{BB962C8B-B14F-4D97-AF65-F5344CB8AC3E}">
+        <p14:creationId xmlns:p14="http://schemas.microsoft.com/office/powerpoint/2010/main" val="1363964258"/>
+      </p:ext>
+    </p:extLst>
+  </p:cSld>
+  <p:clrMapOvr>
+    <a:masterClrMapping/>
+  </p:clrMapOvr>
+</p:sld>
+</file>
+
+<file path=ppt/slides/slide8.xml><?xml version="1.0" encoding="utf-8"?>
+<p:sld xmlns:a="http://schemas.openxmlformats.org/drawingml/2006/main" xmlns:r="http://schemas.openxmlformats.org/officeDocument/2006/relationships" xmlns:p="http://schemas.openxmlformats.org/presentationml/2006/main">
+  <p:cSld>
+    <p:spTree>
+      <p:nvGrpSpPr>
+        <p:cNvPr id="1" name=""/>
+        <p:cNvGrpSpPr/>
+        <p:nvPr/>
+      </p:nvGrpSpPr>
+      <p:grpSpPr>
+        <a:xfrm>
+          <a:off x="0" y="0"/>
+          <a:ext cx="0" cy="0"/>
+          <a:chOff x="0" y="0"/>
+          <a:chExt cx="0" cy="0"/>
+        </a:xfrm>
+      </p:grpSpPr>
+      <p:sp>
+        <p:nvSpPr>
+          <p:cNvPr id="2" name="Title 1">
+            <a:extLst>
+              <a:ext uri="{FF2B5EF4-FFF2-40B4-BE49-F238E27FC236}">
+                <a16:creationId xmlns:a16="http://schemas.microsoft.com/office/drawing/2014/main" id="{0FC91CAD-9745-D84A-9246-51351007E4AA}"/>
+              </a:ext>
+            </a:extLst>
+          </p:cNvPr>
+          <p:cNvSpPr>
+            <a:spLocks noGrp="1"/>
+          </p:cNvSpPr>
+          <p:nvPr>
+            <p:ph type="title"/>
+          </p:nvPr>
+        </p:nvSpPr>
+        <p:spPr>
+          <a:xfrm>
+            <a:off x="460615" y="483077"/>
+            <a:ext cx="9772169" cy="423193"/>
+          </a:xfrm>
+        </p:spPr>
+        <p:txBody>
+          <a:bodyPr/>
+          <a:lstStyle/>
+          <a:p>
+            <a:pPr algn="ctr"/>
+            <a:r>
+              <a:rPr lang="en-US" dirty="0"/>
+              <a:t>Why using Testbed in Angular?</a:t>
+            </a:r>
+            <a:endParaRPr lang="en-NL" dirty="0"/>
+          </a:p>
+        </p:txBody>
+      </p:sp>
+      <p:pic>
+        <p:nvPicPr>
+          <p:cNvPr id="5" name="Picture 4" descr="Text&#10;&#10;Description automatically generated">
+            <a:extLst>
+              <a:ext uri="{FF2B5EF4-FFF2-40B4-BE49-F238E27FC236}">
+                <a16:creationId xmlns:a16="http://schemas.microsoft.com/office/drawing/2014/main" id="{16F0A620-977C-3141-91C5-8CC984484B35}"/>
+              </a:ext>
+            </a:extLst>
+          </p:cNvPr>
+          <p:cNvPicPr>
+            <a:picLocks noChangeAspect="1"/>
+          </p:cNvPicPr>
+          <p:nvPr/>
+        </p:nvPicPr>
+        <p:blipFill>
+          <a:blip r:embed="rId2">
+            <a:extLst>
+              <a:ext uri="{28A0092B-C50C-407E-A947-70E740481C1C}">
+                <a14:useLocalDpi xmlns:a14="http://schemas.microsoft.com/office/drawing/2010/main" val="0"/>
+              </a:ext>
+            </a:extLst>
+          </a:blip>
+          <a:stretch>
+            <a:fillRect/>
+          </a:stretch>
+        </p:blipFill>
+        <p:spPr>
+          <a:xfrm>
+            <a:off x="0" y="1910440"/>
+            <a:ext cx="10693400" cy="3741970"/>
+          </a:xfrm>
+          <a:prstGeom prst="rect">
+            <a:avLst/>
+          </a:prstGeom>
+        </p:spPr>
+      </p:pic>
+    </p:spTree>
+    <p:extLst>
+      <p:ext uri="{BB962C8B-B14F-4D97-AF65-F5344CB8AC3E}">
+        <p14:creationId xmlns:p14="http://schemas.microsoft.com/office/powerpoint/2010/main" val="969737422"/>
+      </p:ext>
+    </p:extLst>
+  </p:cSld>
+  <p:clrMapOvr>
+    <a:masterClrMapping/>
+  </p:clrMapOvr>
+</p:sld>
+</file>
+
 <file path=ppt/slides/slide9.xml><?xml version="1.0" encoding="utf-8"?>
 <p:sld xmlns:a="http://schemas.openxmlformats.org/drawingml/2006/main" xmlns:r="http://schemas.openxmlformats.org/officeDocument/2006/relationships" xmlns:p="http://schemas.openxmlformats.org/presentationml/2006/main">
   <p:cSld>
@@ -2845,7 +4983,7 @@
           <p:cNvPr id="2" name="Title 1">
             <a:extLst>
               <a:ext uri="{FF2B5EF4-FFF2-40B4-BE49-F238E27FC236}">
-                <a16:creationId xmlns:a16="http://schemas.microsoft.com/office/drawing/2014/main" id="{DB616C42-A7A9-AE44-823C-AB44FB9FE6F8}"/>
+                <a16:creationId xmlns:a16="http://schemas.microsoft.com/office/drawing/2014/main" id="{62E8DDAD-8541-964F-96BB-C55B9E97C576}"/>
               </a:ext>
             </a:extLst>
           </p:cNvPr>
@@ -2868,111 +5006,53 @@
           <a:p>
             <a:pPr algn="ctr"/>
             <a:r>
-              <a:rPr lang="en-NL" dirty="0"/>
-              <a:t>G07- Unit testing</a:t>
-            </a:r>
-          </a:p>
-        </p:txBody>
-      </p:sp>
-      <p:sp>
-        <p:nvSpPr>
-          <p:cNvPr id="3" name="Text Placeholder 2">
+              <a:rPr lang="en-US" dirty="0"/>
+              <a:t>How to write a unit tests?</a:t>
+            </a:r>
+            <a:endParaRPr lang="en-NL" dirty="0"/>
+          </a:p>
+        </p:txBody>
+      </p:sp>
+      <p:pic>
+        <p:nvPicPr>
+          <p:cNvPr id="5" name="Picture 4" descr="A picture containing text, sign&#10;&#10;Description automatically generated">
             <a:extLst>
               <a:ext uri="{FF2B5EF4-FFF2-40B4-BE49-F238E27FC236}">
-                <a16:creationId xmlns:a16="http://schemas.microsoft.com/office/drawing/2014/main" id="{0970C9B2-0B8F-F147-A599-9E2DB25671AB}"/>
+                <a16:creationId xmlns:a16="http://schemas.microsoft.com/office/drawing/2014/main" id="{D7BB965C-C2DE-6D4D-B908-7FC73093D5B1}"/>
               </a:ext>
             </a:extLst>
           </p:cNvPr>
-          <p:cNvSpPr>
-            <a:spLocks noGrp="1"/>
-          </p:cNvSpPr>
-          <p:nvPr>
-            <p:ph type="body" idx="1"/>
-          </p:nvPr>
-        </p:nvSpPr>
+          <p:cNvPicPr>
+            <a:picLocks noChangeAspect="1"/>
+          </p:cNvPicPr>
+          <p:nvPr/>
+        </p:nvPicPr>
+        <p:blipFill>
+          <a:blip r:embed="rId3">
+            <a:extLst>
+              <a:ext uri="{28A0092B-C50C-407E-A947-70E740481C1C}">
+                <a14:useLocalDpi xmlns:a14="http://schemas.microsoft.com/office/drawing/2010/main" val="0"/>
+              </a:ext>
+            </a:extLst>
+          </a:blip>
+          <a:stretch>
+            <a:fillRect/>
+          </a:stretch>
+        </p:blipFill>
         <p:spPr>
           <a:xfrm>
-            <a:off x="1586617" y="2257425"/>
-            <a:ext cx="8895474" cy="3300904"/>
+            <a:off x="1663699" y="1343025"/>
+            <a:ext cx="7366000" cy="5549900"/>
           </a:xfrm>
+          <a:prstGeom prst="rect">
+            <a:avLst/>
+          </a:prstGeom>
         </p:spPr>
-        <p:txBody>
-          <a:bodyPr/>
-          <a:lstStyle/>
-          <a:p>
-            <a:r>
-              <a:rPr lang="en-NL" b="1" u="sng" dirty="0"/>
-              <a:t>Frontend</a:t>
-            </a:r>
-            <a:r>
-              <a:rPr lang="en-NL" dirty="0"/>
-              <a:t>:</a:t>
-            </a:r>
-          </a:p>
-          <a:p>
-            <a:r>
-              <a:rPr lang="en-NL" dirty="0"/>
-              <a:t>npm install</a:t>
-            </a:r>
-          </a:p>
-          <a:p>
-            <a:r>
-              <a:rPr lang="en-GB" dirty="0"/>
-              <a:t>n</a:t>
-            </a:r>
-            <a:r>
-              <a:rPr lang="en-NL" dirty="0"/>
-              <a:t>pm start</a:t>
-            </a:r>
-          </a:p>
-          <a:p>
-            <a:endParaRPr lang="en-NL" dirty="0"/>
-          </a:p>
-          <a:p>
-            <a:endParaRPr lang="en-NL" dirty="0"/>
-          </a:p>
-          <a:p>
-            <a:r>
-              <a:rPr lang="en-NL" b="1" u="sng" dirty="0"/>
-              <a:t>Backend</a:t>
-            </a:r>
-            <a:endParaRPr lang="en-NL" dirty="0"/>
-          </a:p>
-          <a:p>
-            <a:r>
-              <a:rPr lang="en-GB" dirty="0"/>
-              <a:t>n</a:t>
-            </a:r>
-            <a:r>
-              <a:rPr lang="en-NL" dirty="0"/>
-              <a:t>pm run server</a:t>
-            </a:r>
-          </a:p>
-          <a:p>
-            <a:endParaRPr lang="en-NL" dirty="0"/>
-          </a:p>
-          <a:p>
-            <a:endParaRPr lang="en-NL" dirty="0"/>
-          </a:p>
-          <a:p>
-            <a:r>
-              <a:rPr lang="en-NL" b="1" u="sng" dirty="0"/>
-              <a:t>Start Karma tests:</a:t>
-            </a:r>
-          </a:p>
-          <a:p>
-            <a:r>
-              <a:rPr lang="en-GB" dirty="0"/>
-              <a:t>ng test</a:t>
-            </a:r>
-            <a:endParaRPr lang="en-NL" dirty="0"/>
-          </a:p>
-        </p:txBody>
-      </p:sp>
+      </p:pic>
     </p:spTree>
     <p:extLst>
       <p:ext uri="{BB962C8B-B14F-4D97-AF65-F5344CB8AC3E}">
-        <p14:creationId xmlns:p14="http://schemas.microsoft.com/office/powerpoint/2010/main" val="705454719"/>
+        <p14:creationId xmlns:p14="http://schemas.microsoft.com/office/powerpoint/2010/main" val="1632968369"/>
       </p:ext>
     </p:extLst>
   </p:cSld>

</xml_diff>